<commit_message>
update book list update CA5G update Git update 3GPP analysis
</commit_message>
<xml_diff>
--- a/Temp/Template.pptx
+++ b/Temp/Template.pptx
@@ -6,8 +6,9 @@
   </p:sldMasterIdLst>
   <p:sldIdLst>
     <p:sldId id="256" r:id="rId2"/>
-    <p:sldId id="257" r:id="rId3"/>
-    <p:sldId id="258" r:id="rId4"/>
+    <p:sldId id="259" r:id="rId3"/>
+    <p:sldId id="257" r:id="rId4"/>
+    <p:sldId id="258" r:id="rId5"/>
   </p:sldIdLst>
   <p:sldSz cx="12192000" cy="6858000"/>
   <p:notesSz cx="6858000" cy="9144000"/>
@@ -156,10 +157,9 @@
           </a:lstStyle>
           <a:p>
             <a:r>
-              <a:rPr lang="ko-KR" altLang="en-US" smtClean="0"/>
+              <a:rPr lang="ko-KR" altLang="en-US"/>
               <a:t>마스터 제목 스타일 편집</a:t>
             </a:r>
-            <a:endParaRPr lang="ko-KR" altLang="en-US"/>
           </a:p>
         </p:txBody>
       </p:sp>
@@ -221,10 +221,9 @@
           </a:lstStyle>
           <a:p>
             <a:r>
-              <a:rPr lang="ko-KR" altLang="en-US" smtClean="0"/>
+              <a:rPr lang="ko-KR" altLang="en-US"/>
               <a:t>클릭하여 마스터 부제목 스타일 편집</a:t>
             </a:r>
-            <a:endParaRPr lang="ko-KR" altLang="en-US"/>
           </a:p>
         </p:txBody>
       </p:sp>
@@ -245,7 +244,7 @@
           <a:p>
             <a:fld id="{1B938007-6263-4BC2-ABBF-506EF1EBE5B0}" type="datetimeFigureOut">
               <a:rPr lang="ko-KR" altLang="en-US" smtClean="0"/>
-              <a:t>2019-12-15</a:t>
+              <a:t>2020-01-09</a:t>
             </a:fld>
             <a:endParaRPr lang="ko-KR" altLang="en-US"/>
           </a:p>
@@ -339,10 +338,9 @@
           <a:lstStyle/>
           <a:p>
             <a:r>
-              <a:rPr lang="ko-KR" altLang="en-US" smtClean="0"/>
+              <a:rPr lang="ko-KR" altLang="en-US"/>
               <a:t>마스터 제목 스타일 편집</a:t>
             </a:r>
-            <a:endParaRPr lang="ko-KR" altLang="en-US"/>
           </a:p>
         </p:txBody>
       </p:sp>
@@ -363,38 +361,37 @@
           <a:p>
             <a:pPr lvl="0"/>
             <a:r>
-              <a:rPr lang="ko-KR" altLang="en-US" smtClean="0"/>
+              <a:rPr lang="ko-KR" altLang="en-US"/>
               <a:t>마스터 텍스트 스타일 편집</a:t>
             </a:r>
           </a:p>
           <a:p>
             <a:pPr lvl="1"/>
             <a:r>
-              <a:rPr lang="ko-KR" altLang="en-US" smtClean="0"/>
+              <a:rPr lang="ko-KR" altLang="en-US"/>
               <a:t>둘째 수준</a:t>
             </a:r>
           </a:p>
           <a:p>
             <a:pPr lvl="2"/>
             <a:r>
-              <a:rPr lang="ko-KR" altLang="en-US" smtClean="0"/>
+              <a:rPr lang="ko-KR" altLang="en-US"/>
               <a:t>셋째 수준</a:t>
             </a:r>
           </a:p>
           <a:p>
             <a:pPr lvl="3"/>
             <a:r>
-              <a:rPr lang="ko-KR" altLang="en-US" smtClean="0"/>
+              <a:rPr lang="ko-KR" altLang="en-US"/>
               <a:t>넷째 수준</a:t>
             </a:r>
           </a:p>
           <a:p>
             <a:pPr lvl="4"/>
             <a:r>
-              <a:rPr lang="ko-KR" altLang="en-US" smtClean="0"/>
+              <a:rPr lang="ko-KR" altLang="en-US"/>
               <a:t>다섯째 수준</a:t>
             </a:r>
-            <a:endParaRPr lang="ko-KR" altLang="en-US"/>
           </a:p>
         </p:txBody>
       </p:sp>
@@ -415,7 +412,7 @@
           <a:p>
             <a:fld id="{1B938007-6263-4BC2-ABBF-506EF1EBE5B0}" type="datetimeFigureOut">
               <a:rPr lang="ko-KR" altLang="en-US" smtClean="0"/>
-              <a:t>2019-12-15</a:t>
+              <a:t>2020-01-09</a:t>
             </a:fld>
             <a:endParaRPr lang="ko-KR" altLang="en-US"/>
           </a:p>
@@ -514,10 +511,9 @@
           <a:lstStyle/>
           <a:p>
             <a:r>
-              <a:rPr lang="ko-KR" altLang="en-US" smtClean="0"/>
+              <a:rPr lang="ko-KR" altLang="en-US"/>
               <a:t>마스터 제목 스타일 편집</a:t>
             </a:r>
-            <a:endParaRPr lang="ko-KR" altLang="en-US"/>
           </a:p>
         </p:txBody>
       </p:sp>
@@ -543,38 +539,37 @@
           <a:p>
             <a:pPr lvl="0"/>
             <a:r>
-              <a:rPr lang="ko-KR" altLang="en-US" smtClean="0"/>
+              <a:rPr lang="ko-KR" altLang="en-US"/>
               <a:t>마스터 텍스트 스타일 편집</a:t>
             </a:r>
           </a:p>
           <a:p>
             <a:pPr lvl="1"/>
             <a:r>
-              <a:rPr lang="ko-KR" altLang="en-US" smtClean="0"/>
+              <a:rPr lang="ko-KR" altLang="en-US"/>
               <a:t>둘째 수준</a:t>
             </a:r>
           </a:p>
           <a:p>
             <a:pPr lvl="2"/>
             <a:r>
-              <a:rPr lang="ko-KR" altLang="en-US" smtClean="0"/>
+              <a:rPr lang="ko-KR" altLang="en-US"/>
               <a:t>셋째 수준</a:t>
             </a:r>
           </a:p>
           <a:p>
             <a:pPr lvl="3"/>
             <a:r>
-              <a:rPr lang="ko-KR" altLang="en-US" smtClean="0"/>
+              <a:rPr lang="ko-KR" altLang="en-US"/>
               <a:t>넷째 수준</a:t>
             </a:r>
           </a:p>
           <a:p>
             <a:pPr lvl="4"/>
             <a:r>
-              <a:rPr lang="ko-KR" altLang="en-US" smtClean="0"/>
+              <a:rPr lang="ko-KR" altLang="en-US"/>
               <a:t>다섯째 수준</a:t>
             </a:r>
-            <a:endParaRPr lang="ko-KR" altLang="en-US"/>
           </a:p>
         </p:txBody>
       </p:sp>
@@ -595,7 +590,7 @@
           <a:p>
             <a:fld id="{1B938007-6263-4BC2-ABBF-506EF1EBE5B0}" type="datetimeFigureOut">
               <a:rPr lang="ko-KR" altLang="en-US" smtClean="0"/>
-              <a:t>2019-12-15</a:t>
+              <a:t>2020-01-09</a:t>
             </a:fld>
             <a:endParaRPr lang="ko-KR" altLang="en-US"/>
           </a:p>
@@ -689,10 +684,9 @@
           <a:lstStyle/>
           <a:p>
             <a:r>
-              <a:rPr lang="ko-KR" altLang="en-US" smtClean="0"/>
+              <a:rPr lang="ko-KR" altLang="en-US"/>
               <a:t>마스터 제목 스타일 편집</a:t>
             </a:r>
-            <a:endParaRPr lang="ko-KR" altLang="en-US"/>
           </a:p>
         </p:txBody>
       </p:sp>
@@ -713,38 +707,37 @@
           <a:p>
             <a:pPr lvl="0"/>
             <a:r>
-              <a:rPr lang="ko-KR" altLang="en-US" smtClean="0"/>
+              <a:rPr lang="ko-KR" altLang="en-US"/>
               <a:t>마스터 텍스트 스타일 편집</a:t>
             </a:r>
           </a:p>
           <a:p>
             <a:pPr lvl="1"/>
             <a:r>
-              <a:rPr lang="ko-KR" altLang="en-US" smtClean="0"/>
+              <a:rPr lang="ko-KR" altLang="en-US"/>
               <a:t>둘째 수준</a:t>
             </a:r>
           </a:p>
           <a:p>
             <a:pPr lvl="2"/>
             <a:r>
-              <a:rPr lang="ko-KR" altLang="en-US" smtClean="0"/>
+              <a:rPr lang="ko-KR" altLang="en-US"/>
               <a:t>셋째 수준</a:t>
             </a:r>
           </a:p>
           <a:p>
             <a:pPr lvl="3"/>
             <a:r>
-              <a:rPr lang="ko-KR" altLang="en-US" smtClean="0"/>
+              <a:rPr lang="ko-KR" altLang="en-US"/>
               <a:t>넷째 수준</a:t>
             </a:r>
           </a:p>
           <a:p>
             <a:pPr lvl="4"/>
             <a:r>
-              <a:rPr lang="ko-KR" altLang="en-US" smtClean="0"/>
+              <a:rPr lang="ko-KR" altLang="en-US"/>
               <a:t>다섯째 수준</a:t>
             </a:r>
-            <a:endParaRPr lang="ko-KR" altLang="en-US"/>
           </a:p>
         </p:txBody>
       </p:sp>
@@ -765,7 +758,7 @@
           <a:p>
             <a:fld id="{1B938007-6263-4BC2-ABBF-506EF1EBE5B0}" type="datetimeFigureOut">
               <a:rPr lang="ko-KR" altLang="en-US" smtClean="0"/>
-              <a:t>2019-12-15</a:t>
+              <a:t>2020-01-09</a:t>
             </a:fld>
             <a:endParaRPr lang="ko-KR" altLang="en-US"/>
           </a:p>
@@ -868,10 +861,9 @@
           </a:lstStyle>
           <a:p>
             <a:r>
-              <a:rPr lang="ko-KR" altLang="en-US" smtClean="0"/>
+              <a:rPr lang="ko-KR" altLang="en-US"/>
               <a:t>마스터 제목 스타일 편집</a:t>
             </a:r>
-            <a:endParaRPr lang="ko-KR" altLang="en-US"/>
           </a:p>
         </p:txBody>
       </p:sp>
@@ -988,7 +980,7 @@
           <a:p>
             <a:pPr lvl="0"/>
             <a:r>
-              <a:rPr lang="ko-KR" altLang="en-US" smtClean="0"/>
+              <a:rPr lang="ko-KR" altLang="en-US"/>
               <a:t>마스터 텍스트 스타일 편집</a:t>
             </a:r>
           </a:p>
@@ -1011,7 +1003,7 @@
           <a:p>
             <a:fld id="{1B938007-6263-4BC2-ABBF-506EF1EBE5B0}" type="datetimeFigureOut">
               <a:rPr lang="ko-KR" altLang="en-US" smtClean="0"/>
-              <a:t>2019-12-15</a:t>
+              <a:t>2020-01-09</a:t>
             </a:fld>
             <a:endParaRPr lang="ko-KR" altLang="en-US"/>
           </a:p>
@@ -1105,10 +1097,9 @@
           <a:lstStyle/>
           <a:p>
             <a:r>
-              <a:rPr lang="ko-KR" altLang="en-US" smtClean="0"/>
+              <a:rPr lang="ko-KR" altLang="en-US"/>
               <a:t>마스터 제목 스타일 편집</a:t>
             </a:r>
-            <a:endParaRPr lang="ko-KR" altLang="en-US"/>
           </a:p>
         </p:txBody>
       </p:sp>
@@ -1134,38 +1125,37 @@
           <a:p>
             <a:pPr lvl="0"/>
             <a:r>
-              <a:rPr lang="ko-KR" altLang="en-US" smtClean="0"/>
+              <a:rPr lang="ko-KR" altLang="en-US"/>
               <a:t>마스터 텍스트 스타일 편집</a:t>
             </a:r>
           </a:p>
           <a:p>
             <a:pPr lvl="1"/>
             <a:r>
-              <a:rPr lang="ko-KR" altLang="en-US" smtClean="0"/>
+              <a:rPr lang="ko-KR" altLang="en-US"/>
               <a:t>둘째 수준</a:t>
             </a:r>
           </a:p>
           <a:p>
             <a:pPr lvl="2"/>
             <a:r>
-              <a:rPr lang="ko-KR" altLang="en-US" smtClean="0"/>
+              <a:rPr lang="ko-KR" altLang="en-US"/>
               <a:t>셋째 수준</a:t>
             </a:r>
           </a:p>
           <a:p>
             <a:pPr lvl="3"/>
             <a:r>
-              <a:rPr lang="ko-KR" altLang="en-US" smtClean="0"/>
+              <a:rPr lang="ko-KR" altLang="en-US"/>
               <a:t>넷째 수준</a:t>
             </a:r>
           </a:p>
           <a:p>
             <a:pPr lvl="4"/>
             <a:r>
-              <a:rPr lang="ko-KR" altLang="en-US" smtClean="0"/>
+              <a:rPr lang="ko-KR" altLang="en-US"/>
               <a:t>다섯째 수준</a:t>
             </a:r>
-            <a:endParaRPr lang="ko-KR" altLang="en-US"/>
           </a:p>
         </p:txBody>
       </p:sp>
@@ -1191,38 +1181,37 @@
           <a:p>
             <a:pPr lvl="0"/>
             <a:r>
-              <a:rPr lang="ko-KR" altLang="en-US" smtClean="0"/>
+              <a:rPr lang="ko-KR" altLang="en-US"/>
               <a:t>마스터 텍스트 스타일 편집</a:t>
             </a:r>
           </a:p>
           <a:p>
             <a:pPr lvl="1"/>
             <a:r>
-              <a:rPr lang="ko-KR" altLang="en-US" smtClean="0"/>
+              <a:rPr lang="ko-KR" altLang="en-US"/>
               <a:t>둘째 수준</a:t>
             </a:r>
           </a:p>
           <a:p>
             <a:pPr lvl="2"/>
             <a:r>
-              <a:rPr lang="ko-KR" altLang="en-US" smtClean="0"/>
+              <a:rPr lang="ko-KR" altLang="en-US"/>
               <a:t>셋째 수준</a:t>
             </a:r>
           </a:p>
           <a:p>
             <a:pPr lvl="3"/>
             <a:r>
-              <a:rPr lang="ko-KR" altLang="en-US" smtClean="0"/>
+              <a:rPr lang="ko-KR" altLang="en-US"/>
               <a:t>넷째 수준</a:t>
             </a:r>
           </a:p>
           <a:p>
             <a:pPr lvl="4"/>
             <a:r>
-              <a:rPr lang="ko-KR" altLang="en-US" smtClean="0"/>
+              <a:rPr lang="ko-KR" altLang="en-US"/>
               <a:t>다섯째 수준</a:t>
             </a:r>
-            <a:endParaRPr lang="ko-KR" altLang="en-US"/>
           </a:p>
         </p:txBody>
       </p:sp>
@@ -1243,7 +1232,7 @@
           <a:p>
             <a:fld id="{1B938007-6263-4BC2-ABBF-506EF1EBE5B0}" type="datetimeFigureOut">
               <a:rPr lang="ko-KR" altLang="en-US" smtClean="0"/>
-              <a:t>2019-12-15</a:t>
+              <a:t>2020-01-09</a:t>
             </a:fld>
             <a:endParaRPr lang="ko-KR" altLang="en-US"/>
           </a:p>
@@ -1342,10 +1331,9 @@
           <a:lstStyle/>
           <a:p>
             <a:r>
-              <a:rPr lang="ko-KR" altLang="en-US" smtClean="0"/>
+              <a:rPr lang="ko-KR" altLang="en-US"/>
               <a:t>마스터 제목 스타일 편집</a:t>
             </a:r>
-            <a:endParaRPr lang="ko-KR" altLang="en-US"/>
           </a:p>
         </p:txBody>
       </p:sp>
@@ -1408,7 +1396,7 @@
           <a:p>
             <a:pPr lvl="0"/>
             <a:r>
-              <a:rPr lang="ko-KR" altLang="en-US" smtClean="0"/>
+              <a:rPr lang="ko-KR" altLang="en-US"/>
               <a:t>마스터 텍스트 스타일 편집</a:t>
             </a:r>
           </a:p>
@@ -1436,38 +1424,37 @@
           <a:p>
             <a:pPr lvl="0"/>
             <a:r>
-              <a:rPr lang="ko-KR" altLang="en-US" smtClean="0"/>
+              <a:rPr lang="ko-KR" altLang="en-US"/>
               <a:t>마스터 텍스트 스타일 편집</a:t>
             </a:r>
           </a:p>
           <a:p>
             <a:pPr lvl="1"/>
             <a:r>
-              <a:rPr lang="ko-KR" altLang="en-US" smtClean="0"/>
+              <a:rPr lang="ko-KR" altLang="en-US"/>
               <a:t>둘째 수준</a:t>
             </a:r>
           </a:p>
           <a:p>
             <a:pPr lvl="2"/>
             <a:r>
-              <a:rPr lang="ko-KR" altLang="en-US" smtClean="0"/>
+              <a:rPr lang="ko-KR" altLang="en-US"/>
               <a:t>셋째 수준</a:t>
             </a:r>
           </a:p>
           <a:p>
             <a:pPr lvl="3"/>
             <a:r>
-              <a:rPr lang="ko-KR" altLang="en-US" smtClean="0"/>
+              <a:rPr lang="ko-KR" altLang="en-US"/>
               <a:t>넷째 수준</a:t>
             </a:r>
           </a:p>
           <a:p>
             <a:pPr lvl="4"/>
             <a:r>
-              <a:rPr lang="ko-KR" altLang="en-US" smtClean="0"/>
+              <a:rPr lang="ko-KR" altLang="en-US"/>
               <a:t>다섯째 수준</a:t>
             </a:r>
-            <a:endParaRPr lang="ko-KR" altLang="en-US"/>
           </a:p>
         </p:txBody>
       </p:sp>
@@ -1530,7 +1517,7 @@
           <a:p>
             <a:pPr lvl="0"/>
             <a:r>
-              <a:rPr lang="ko-KR" altLang="en-US" smtClean="0"/>
+              <a:rPr lang="ko-KR" altLang="en-US"/>
               <a:t>마스터 텍스트 스타일 편집</a:t>
             </a:r>
           </a:p>
@@ -1558,38 +1545,37 @@
           <a:p>
             <a:pPr lvl="0"/>
             <a:r>
-              <a:rPr lang="ko-KR" altLang="en-US" smtClean="0"/>
+              <a:rPr lang="ko-KR" altLang="en-US"/>
               <a:t>마스터 텍스트 스타일 편집</a:t>
             </a:r>
           </a:p>
           <a:p>
             <a:pPr lvl="1"/>
             <a:r>
-              <a:rPr lang="ko-KR" altLang="en-US" smtClean="0"/>
+              <a:rPr lang="ko-KR" altLang="en-US"/>
               <a:t>둘째 수준</a:t>
             </a:r>
           </a:p>
           <a:p>
             <a:pPr lvl="2"/>
             <a:r>
-              <a:rPr lang="ko-KR" altLang="en-US" smtClean="0"/>
+              <a:rPr lang="ko-KR" altLang="en-US"/>
               <a:t>셋째 수준</a:t>
             </a:r>
           </a:p>
           <a:p>
             <a:pPr lvl="3"/>
             <a:r>
-              <a:rPr lang="ko-KR" altLang="en-US" smtClean="0"/>
+              <a:rPr lang="ko-KR" altLang="en-US"/>
               <a:t>넷째 수준</a:t>
             </a:r>
           </a:p>
           <a:p>
             <a:pPr lvl="4"/>
             <a:r>
-              <a:rPr lang="ko-KR" altLang="en-US" smtClean="0"/>
+              <a:rPr lang="ko-KR" altLang="en-US"/>
               <a:t>다섯째 수준</a:t>
             </a:r>
-            <a:endParaRPr lang="ko-KR" altLang="en-US"/>
           </a:p>
         </p:txBody>
       </p:sp>
@@ -1610,7 +1596,7 @@
           <a:p>
             <a:fld id="{1B938007-6263-4BC2-ABBF-506EF1EBE5B0}" type="datetimeFigureOut">
               <a:rPr lang="ko-KR" altLang="en-US" smtClean="0"/>
-              <a:t>2019-12-15</a:t>
+              <a:t>2020-01-09</a:t>
             </a:fld>
             <a:endParaRPr lang="ko-KR" altLang="en-US"/>
           </a:p>
@@ -1704,10 +1690,9 @@
           <a:lstStyle/>
           <a:p>
             <a:r>
-              <a:rPr lang="ko-KR" altLang="en-US" smtClean="0"/>
+              <a:rPr lang="ko-KR" altLang="en-US"/>
               <a:t>마스터 제목 스타일 편집</a:t>
             </a:r>
-            <a:endParaRPr lang="ko-KR" altLang="en-US"/>
           </a:p>
         </p:txBody>
       </p:sp>
@@ -1728,7 +1713,7 @@
           <a:p>
             <a:fld id="{1B938007-6263-4BC2-ABBF-506EF1EBE5B0}" type="datetimeFigureOut">
               <a:rPr lang="ko-KR" altLang="en-US" smtClean="0"/>
-              <a:t>2019-12-15</a:t>
+              <a:t>2020-01-09</a:t>
             </a:fld>
             <a:endParaRPr lang="ko-KR" altLang="en-US"/>
           </a:p>
@@ -1823,7 +1808,7 @@
           <a:p>
             <a:fld id="{1B938007-6263-4BC2-ABBF-506EF1EBE5B0}" type="datetimeFigureOut">
               <a:rPr lang="ko-KR" altLang="en-US" smtClean="0"/>
-              <a:t>2019-12-15</a:t>
+              <a:t>2020-01-09</a:t>
             </a:fld>
             <a:endParaRPr lang="ko-KR" altLang="en-US"/>
           </a:p>
@@ -1926,10 +1911,9 @@
           </a:lstStyle>
           <a:p>
             <a:r>
-              <a:rPr lang="ko-KR" altLang="en-US" smtClean="0"/>
+              <a:rPr lang="ko-KR" altLang="en-US"/>
               <a:t>마스터 제목 스타일 편집</a:t>
             </a:r>
-            <a:endParaRPr lang="ko-KR" altLang="en-US"/>
           </a:p>
         </p:txBody>
       </p:sp>
@@ -1983,38 +1967,37 @@
           <a:p>
             <a:pPr lvl="0"/>
             <a:r>
-              <a:rPr lang="ko-KR" altLang="en-US" smtClean="0"/>
+              <a:rPr lang="ko-KR" altLang="en-US"/>
               <a:t>마스터 텍스트 스타일 편집</a:t>
             </a:r>
           </a:p>
           <a:p>
             <a:pPr lvl="1"/>
             <a:r>
-              <a:rPr lang="ko-KR" altLang="en-US" smtClean="0"/>
+              <a:rPr lang="ko-KR" altLang="en-US"/>
               <a:t>둘째 수준</a:t>
             </a:r>
           </a:p>
           <a:p>
             <a:pPr lvl="2"/>
             <a:r>
-              <a:rPr lang="ko-KR" altLang="en-US" smtClean="0"/>
+              <a:rPr lang="ko-KR" altLang="en-US"/>
               <a:t>셋째 수준</a:t>
             </a:r>
           </a:p>
           <a:p>
             <a:pPr lvl="3"/>
             <a:r>
-              <a:rPr lang="ko-KR" altLang="en-US" smtClean="0"/>
+              <a:rPr lang="ko-KR" altLang="en-US"/>
               <a:t>넷째 수준</a:t>
             </a:r>
           </a:p>
           <a:p>
             <a:pPr lvl="4"/>
             <a:r>
-              <a:rPr lang="ko-KR" altLang="en-US" smtClean="0"/>
+              <a:rPr lang="ko-KR" altLang="en-US"/>
               <a:t>다섯째 수준</a:t>
             </a:r>
-            <a:endParaRPr lang="ko-KR" altLang="en-US"/>
           </a:p>
         </p:txBody>
       </p:sp>
@@ -2077,7 +2060,7 @@
           <a:p>
             <a:pPr lvl="0"/>
             <a:r>
-              <a:rPr lang="ko-KR" altLang="en-US" smtClean="0"/>
+              <a:rPr lang="ko-KR" altLang="en-US"/>
               <a:t>마스터 텍스트 스타일 편집</a:t>
             </a:r>
           </a:p>
@@ -2100,7 +2083,7 @@
           <a:p>
             <a:fld id="{1B938007-6263-4BC2-ABBF-506EF1EBE5B0}" type="datetimeFigureOut">
               <a:rPr lang="ko-KR" altLang="en-US" smtClean="0"/>
-              <a:t>2019-12-15</a:t>
+              <a:t>2020-01-09</a:t>
             </a:fld>
             <a:endParaRPr lang="ko-KR" altLang="en-US"/>
           </a:p>
@@ -2203,10 +2186,9 @@
           </a:lstStyle>
           <a:p>
             <a:r>
-              <a:rPr lang="ko-KR" altLang="en-US" smtClean="0"/>
+              <a:rPr lang="ko-KR" altLang="en-US"/>
               <a:t>마스터 제목 스타일 편집</a:t>
             </a:r>
-            <a:endParaRPr lang="ko-KR" altLang="en-US"/>
           </a:p>
         </p:txBody>
       </p:sp>
@@ -2330,7 +2312,7 @@
           <a:p>
             <a:pPr lvl="0"/>
             <a:r>
-              <a:rPr lang="ko-KR" altLang="en-US" smtClean="0"/>
+              <a:rPr lang="ko-KR" altLang="en-US"/>
               <a:t>마스터 텍스트 스타일 편집</a:t>
             </a:r>
           </a:p>
@@ -2353,7 +2335,7 @@
           <a:p>
             <a:fld id="{1B938007-6263-4BC2-ABBF-506EF1EBE5B0}" type="datetimeFigureOut">
               <a:rPr lang="ko-KR" altLang="en-US" smtClean="0"/>
-              <a:t>2019-12-15</a:t>
+              <a:t>2020-01-09</a:t>
             </a:fld>
             <a:endParaRPr lang="ko-KR" altLang="en-US"/>
           </a:p>
@@ -2462,10 +2444,9 @@
           <a:lstStyle/>
           <a:p>
             <a:r>
-              <a:rPr lang="ko-KR" altLang="en-US" smtClean="0"/>
+              <a:rPr lang="ko-KR" altLang="en-US"/>
               <a:t>마스터 제목 스타일 편집</a:t>
             </a:r>
-            <a:endParaRPr lang="ko-KR" altLang="en-US"/>
           </a:p>
         </p:txBody>
       </p:sp>
@@ -2496,38 +2477,37 @@
           <a:p>
             <a:pPr lvl="0"/>
             <a:r>
-              <a:rPr lang="ko-KR" altLang="en-US" smtClean="0"/>
+              <a:rPr lang="ko-KR" altLang="en-US"/>
               <a:t>마스터 텍스트 스타일 편집</a:t>
             </a:r>
           </a:p>
           <a:p>
             <a:pPr lvl="1"/>
             <a:r>
-              <a:rPr lang="ko-KR" altLang="en-US" smtClean="0"/>
+              <a:rPr lang="ko-KR" altLang="en-US"/>
               <a:t>둘째 수준</a:t>
             </a:r>
           </a:p>
           <a:p>
             <a:pPr lvl="2"/>
             <a:r>
-              <a:rPr lang="ko-KR" altLang="en-US" smtClean="0"/>
+              <a:rPr lang="ko-KR" altLang="en-US"/>
               <a:t>셋째 수준</a:t>
             </a:r>
           </a:p>
           <a:p>
             <a:pPr lvl="3"/>
             <a:r>
-              <a:rPr lang="ko-KR" altLang="en-US" smtClean="0"/>
+              <a:rPr lang="ko-KR" altLang="en-US"/>
               <a:t>넷째 수준</a:t>
             </a:r>
           </a:p>
           <a:p>
             <a:pPr lvl="4"/>
             <a:r>
-              <a:rPr lang="ko-KR" altLang="en-US" smtClean="0"/>
+              <a:rPr lang="ko-KR" altLang="en-US"/>
               <a:t>다섯째 수준</a:t>
             </a:r>
-            <a:endParaRPr lang="ko-KR" altLang="en-US"/>
           </a:p>
         </p:txBody>
       </p:sp>
@@ -2566,7 +2546,7 @@
           <a:p>
             <a:fld id="{1B938007-6263-4BC2-ABBF-506EF1EBE5B0}" type="datetimeFigureOut">
               <a:rPr lang="ko-KR" altLang="en-US" smtClean="0"/>
-              <a:t>2019-12-15</a:t>
+              <a:t>2020-01-09</a:t>
             </a:fld>
             <a:endParaRPr lang="ko-KR" altLang="en-US"/>
           </a:p>
@@ -3022,11 +3002,11 @@
             <a:p>
               <a:pPr algn="ctr"/>
               <a:r>
-                <a:rPr lang="ko-KR" altLang="en-US" sz="800" dirty="0" smtClean="0"/>
+                <a:rPr lang="ko-KR" altLang="en-US" sz="800" dirty="0"/>
                 <a:t>파일 수정사항을 제거하고 싶다</a:t>
               </a:r>
               <a:r>
-                <a:rPr lang="en-US" altLang="ko-KR" sz="800" dirty="0" smtClean="0"/>
+                <a:rPr lang="en-US" altLang="ko-KR" sz="800" dirty="0"/>
                 <a:t>.</a:t>
               </a:r>
               <a:endParaRPr lang="ko-KR" altLang="en-US" sz="800" dirty="0"/>
@@ -3070,19 +3050,19 @@
             <a:p>
               <a:pPr algn="ctr"/>
               <a:r>
-                <a:rPr lang="ko-KR" altLang="en-US" sz="800" dirty="0" smtClean="0"/>
+                <a:rPr lang="ko-KR" altLang="en-US" sz="800" dirty="0"/>
                 <a:t>수정사항이 </a:t>
               </a:r>
               <a:r>
-                <a:rPr lang="ko-KR" altLang="en-US" sz="800" dirty="0" err="1" smtClean="0"/>
+                <a:rPr lang="ko-KR" altLang="en-US" sz="800" dirty="0" err="1"/>
                 <a:t>커밋</a:t>
               </a:r>
               <a:r>
-                <a:rPr lang="ko-KR" altLang="en-US" sz="800" dirty="0" smtClean="0"/>
+                <a:rPr lang="ko-KR" altLang="en-US" sz="800" dirty="0"/>
                 <a:t> 되었는가</a:t>
               </a:r>
               <a:r>
-                <a:rPr lang="en-US" altLang="ko-KR" sz="800" dirty="0" smtClean="0"/>
+                <a:rPr lang="en-US" altLang="ko-KR" sz="800" dirty="0"/>
                 <a:t>?</a:t>
               </a:r>
               <a:endParaRPr lang="ko-KR" altLang="en-US" sz="800" dirty="0"/>
@@ -3126,11 +3106,11 @@
             <a:p>
               <a:pPr algn="ctr"/>
               <a:r>
-                <a:rPr lang="ko-KR" altLang="en-US" sz="800" dirty="0" smtClean="0"/>
+                <a:rPr lang="ko-KR" altLang="en-US" sz="800" dirty="0"/>
                 <a:t>수정사항이 준비 영역에 있는가</a:t>
               </a:r>
               <a:r>
-                <a:rPr lang="en-US" altLang="ko-KR" sz="800" dirty="0" smtClean="0"/>
+                <a:rPr lang="en-US" altLang="ko-KR" sz="800" dirty="0"/>
                 <a:t>?</a:t>
               </a:r>
               <a:endParaRPr lang="ko-KR" altLang="en-US" sz="800" dirty="0"/>
@@ -3174,11 +3154,11 @@
             <a:p>
               <a:pPr algn="ctr"/>
               <a:r>
-                <a:rPr lang="ko-KR" altLang="en-US" sz="800" dirty="0" smtClean="0"/>
+                <a:rPr lang="ko-KR" altLang="en-US" sz="800" dirty="0"/>
                 <a:t>로그 기록을 유지하고 싶은가</a:t>
               </a:r>
               <a:r>
-                <a:rPr lang="en-US" altLang="ko-KR" sz="800" dirty="0" smtClean="0"/>
+                <a:rPr lang="en-US" altLang="ko-KR" sz="800" dirty="0"/>
                 <a:t>?</a:t>
               </a:r>
               <a:endParaRPr lang="ko-KR" altLang="en-US" sz="800" dirty="0"/>
@@ -3339,11 +3319,11 @@
             <a:p>
               <a:pPr algn="ctr"/>
               <a:r>
-                <a:rPr lang="ko-KR" altLang="en-US" sz="800" dirty="0" smtClean="0"/>
+                <a:rPr lang="ko-KR" altLang="en-US" sz="800" dirty="0"/>
                 <a:t>작업 폴더에 저장하고 싶은 수정사항이 있는가</a:t>
               </a:r>
               <a:r>
-                <a:rPr lang="en-US" altLang="ko-KR" sz="800" dirty="0" smtClean="0"/>
+                <a:rPr lang="en-US" altLang="ko-KR" sz="800" dirty="0"/>
                 <a:t>?</a:t>
               </a:r>
               <a:endParaRPr lang="ko-KR" altLang="en-US" sz="800" dirty="0"/>
@@ -3432,7 +3412,7 @@
             <a:p>
               <a:pPr algn="ctr"/>
               <a:r>
-                <a:rPr lang="en-US" altLang="ko-KR" sz="900" dirty="0" smtClean="0">
+                <a:rPr lang="en-US" altLang="ko-KR" sz="900" dirty="0">
                   <a:solidFill>
                     <a:schemeClr val="tx1"/>
                   </a:solidFill>
@@ -3529,7 +3509,7 @@
             <a:p>
               <a:pPr algn="ctr"/>
               <a:r>
-                <a:rPr lang="en-US" altLang="ko-KR" sz="900" dirty="0" smtClean="0">
+                <a:rPr lang="en-US" altLang="ko-KR" sz="900" dirty="0">
                   <a:solidFill>
                     <a:schemeClr val="tx1"/>
                   </a:solidFill>
@@ -3626,7 +3606,7 @@
             <a:p>
               <a:pPr algn="ctr"/>
               <a:r>
-                <a:rPr lang="en-US" altLang="ko-KR" sz="900" dirty="0" smtClean="0">
+                <a:rPr lang="en-US" altLang="ko-KR" sz="900" dirty="0">
                   <a:solidFill>
                     <a:schemeClr val="tx1"/>
                   </a:solidFill>
@@ -3792,19 +3772,19 @@
             <a:p>
               <a:pPr algn="ctr"/>
               <a:r>
-                <a:rPr lang="ko-KR" altLang="en-US" sz="800" dirty="0" smtClean="0"/>
+                <a:rPr lang="ko-KR" altLang="en-US" sz="800" dirty="0"/>
                 <a:t>해당 </a:t>
               </a:r>
               <a:r>
-                <a:rPr lang="ko-KR" altLang="en-US" sz="800" dirty="0" err="1" smtClean="0"/>
+                <a:rPr lang="ko-KR" altLang="en-US" sz="800" dirty="0" err="1"/>
                 <a:t>브랜치는</a:t>
               </a:r>
               <a:r>
-                <a:rPr lang="ko-KR" altLang="en-US" sz="800" dirty="0" smtClean="0"/>
+                <a:rPr lang="ko-KR" altLang="en-US" sz="800" dirty="0"/>
                 <a:t> 공유 중인가</a:t>
               </a:r>
               <a:r>
-                <a:rPr lang="en-US" altLang="ko-KR" sz="800" dirty="0" smtClean="0"/>
+                <a:rPr lang="en-US" altLang="ko-KR" sz="800" dirty="0"/>
                 <a:t>?</a:t>
               </a:r>
               <a:endParaRPr lang="ko-KR" altLang="en-US" sz="800" dirty="0"/>
@@ -3929,7 +3909,7 @@
             <a:p>
               <a:pPr algn="ctr"/>
               <a:r>
-                <a:rPr lang="en-US" altLang="ko-KR" sz="900" dirty="0" smtClean="0">
+                <a:rPr lang="en-US" altLang="ko-KR" sz="900" dirty="0">
                   <a:solidFill>
                     <a:schemeClr val="tx1"/>
                   </a:solidFill>
@@ -4044,23 +4024,23 @@
             <a:lstStyle/>
             <a:p>
               <a:r>
-                <a:rPr lang="ko-KR" altLang="en-US" sz="900" dirty="0" err="1" smtClean="0"/>
+                <a:rPr lang="ko-KR" altLang="en-US" sz="900" dirty="0" err="1"/>
                 <a:t>히스토리를</a:t>
               </a:r>
               <a:r>
-                <a:rPr lang="ko-KR" altLang="en-US" sz="900" dirty="0" smtClean="0"/>
+                <a:rPr lang="ko-KR" altLang="en-US" sz="900" dirty="0"/>
                 <a:t> </a:t>
               </a:r>
               <a:r>
-                <a:rPr lang="ko-KR" altLang="en-US" sz="900" dirty="0" err="1" smtClean="0"/>
+                <a:rPr lang="ko-KR" altLang="en-US" sz="900" dirty="0" err="1"/>
                 <a:t>재작성하는</a:t>
               </a:r>
               <a:r>
-                <a:rPr lang="ko-KR" altLang="en-US" sz="900" dirty="0" smtClean="0"/>
+                <a:rPr lang="ko-KR" altLang="en-US" sz="900" dirty="0"/>
                 <a:t> 것은 적절하지 않다</a:t>
               </a:r>
               <a:r>
-                <a:rPr lang="en-US" altLang="ko-KR" sz="900" dirty="0" smtClean="0"/>
+                <a:rPr lang="en-US" altLang="ko-KR" sz="900" dirty="0"/>
                 <a:t>.</a:t>
               </a:r>
               <a:endParaRPr lang="ko-KR" altLang="en-US" sz="900" dirty="0"/>
@@ -4143,19 +4123,19 @@
             <a:p>
               <a:pPr algn="ctr"/>
               <a:r>
-                <a:rPr lang="ko-KR" altLang="en-US" sz="800" dirty="0" smtClean="0"/>
+                <a:rPr lang="ko-KR" altLang="en-US" sz="800" dirty="0"/>
                 <a:t>삭제하고 싶은 수정사항이 가장 최신 </a:t>
               </a:r>
               <a:r>
-                <a:rPr lang="ko-KR" altLang="en-US" sz="800" dirty="0" err="1" smtClean="0"/>
+                <a:rPr lang="ko-KR" altLang="en-US" sz="800" dirty="0" err="1"/>
                 <a:t>커밋에</a:t>
               </a:r>
               <a:r>
-                <a:rPr lang="ko-KR" altLang="en-US" sz="800" dirty="0" smtClean="0"/>
+                <a:rPr lang="ko-KR" altLang="en-US" sz="800" dirty="0"/>
                 <a:t> 속하는가</a:t>
               </a:r>
               <a:r>
-                <a:rPr lang="en-US" altLang="ko-KR" sz="800" dirty="0" smtClean="0"/>
+                <a:rPr lang="en-US" altLang="ko-KR" sz="800" dirty="0"/>
                 <a:t>?</a:t>
               </a:r>
               <a:endParaRPr lang="ko-KR" altLang="en-US" sz="800" dirty="0"/>
@@ -4274,11 +4254,11 @@
             <a:p>
               <a:pPr algn="ctr"/>
               <a:r>
-                <a:rPr lang="ko-KR" altLang="en-US" sz="800" dirty="0" smtClean="0"/>
+                <a:rPr lang="ko-KR" altLang="en-US" sz="800" dirty="0"/>
                 <a:t>작업 폴더에 저장하고 싶은 수정사항이 있는가</a:t>
               </a:r>
               <a:r>
-                <a:rPr lang="en-US" altLang="ko-KR" sz="800" dirty="0" smtClean="0"/>
+                <a:rPr lang="en-US" altLang="ko-KR" sz="800" dirty="0"/>
                 <a:t>?</a:t>
               </a:r>
               <a:endParaRPr lang="ko-KR" altLang="en-US" sz="800" dirty="0"/>
@@ -4367,7 +4347,7 @@
             <a:p>
               <a:pPr algn="ctr"/>
               <a:r>
-                <a:rPr lang="en-US" altLang="ko-KR" sz="900" dirty="0" smtClean="0">
+                <a:rPr lang="en-US" altLang="ko-KR" sz="900" dirty="0">
                   <a:solidFill>
                     <a:schemeClr val="tx1"/>
                   </a:solidFill>
@@ -4464,7 +4444,7 @@
             <a:p>
               <a:pPr algn="ctr"/>
               <a:r>
-                <a:rPr lang="en-US" altLang="ko-KR" sz="900" dirty="0" smtClean="0">
+                <a:rPr lang="en-US" altLang="ko-KR" sz="900" dirty="0">
                   <a:solidFill>
                     <a:schemeClr val="tx1"/>
                   </a:solidFill>
@@ -4561,7 +4541,7 @@
             <a:p>
               <a:pPr algn="ctr"/>
               <a:r>
-                <a:rPr lang="en-US" altLang="ko-KR" sz="900" dirty="0" smtClean="0">
+                <a:rPr lang="en-US" altLang="ko-KR" sz="900" dirty="0">
                   <a:solidFill>
                     <a:schemeClr val="tx1"/>
                   </a:solidFill>
@@ -4638,7 +4618,7 @@
             <a:lstStyle/>
             <a:p>
               <a:r>
-                <a:rPr lang="en-US" altLang="ko-KR" sz="700" dirty="0" smtClean="0">
+                <a:rPr lang="en-US" altLang="ko-KR" sz="700" dirty="0">
                   <a:solidFill>
                     <a:srgbClr val="0000FF"/>
                   </a:solidFill>
@@ -4676,7 +4656,7 @@
             <a:lstStyle/>
             <a:p>
               <a:r>
-                <a:rPr lang="en-US" altLang="ko-KR" sz="700" dirty="0" smtClean="0">
+                <a:rPr lang="en-US" altLang="ko-KR" sz="700" dirty="0">
                   <a:solidFill>
                     <a:srgbClr val="FF0000"/>
                   </a:solidFill>
@@ -4714,7 +4694,7 @@
             <a:lstStyle/>
             <a:p>
               <a:r>
-                <a:rPr lang="en-US" altLang="ko-KR" sz="700" dirty="0" smtClean="0">
+                <a:rPr lang="en-US" altLang="ko-KR" sz="700" dirty="0">
                   <a:solidFill>
                     <a:srgbClr val="0000FF"/>
                   </a:solidFill>
@@ -4752,7 +4732,7 @@
             <a:lstStyle/>
             <a:p>
               <a:r>
-                <a:rPr lang="en-US" altLang="ko-KR" sz="700" dirty="0" smtClean="0">
+                <a:rPr lang="en-US" altLang="ko-KR" sz="700" dirty="0">
                   <a:solidFill>
                     <a:srgbClr val="0000FF"/>
                   </a:solidFill>
@@ -4790,7 +4770,7 @@
             <a:lstStyle/>
             <a:p>
               <a:r>
-                <a:rPr lang="en-US" altLang="ko-KR" sz="700" dirty="0" smtClean="0">
+                <a:rPr lang="en-US" altLang="ko-KR" sz="700" dirty="0">
                   <a:solidFill>
                     <a:srgbClr val="0000FF"/>
                   </a:solidFill>
@@ -4828,7 +4808,7 @@
             <a:lstStyle/>
             <a:p>
               <a:r>
-                <a:rPr lang="en-US" altLang="ko-KR" sz="700" dirty="0" smtClean="0">
+                <a:rPr lang="en-US" altLang="ko-KR" sz="700" dirty="0">
                   <a:solidFill>
                     <a:srgbClr val="0000FF"/>
                   </a:solidFill>
@@ -4866,7 +4846,7 @@
             <a:lstStyle/>
             <a:p>
               <a:r>
-                <a:rPr lang="en-US" altLang="ko-KR" sz="700" dirty="0" smtClean="0">
+                <a:rPr lang="en-US" altLang="ko-KR" sz="700" dirty="0">
                   <a:solidFill>
                     <a:srgbClr val="FF0000"/>
                   </a:solidFill>
@@ -4904,7 +4884,7 @@
             <a:lstStyle/>
             <a:p>
               <a:r>
-                <a:rPr lang="en-US" altLang="ko-KR" sz="700" dirty="0" smtClean="0">
+                <a:rPr lang="en-US" altLang="ko-KR" sz="700" dirty="0">
                   <a:solidFill>
                     <a:srgbClr val="FF0000"/>
                   </a:solidFill>
@@ -4942,7 +4922,7 @@
             <a:lstStyle/>
             <a:p>
               <a:r>
-                <a:rPr lang="en-US" altLang="ko-KR" sz="700" dirty="0" smtClean="0">
+                <a:rPr lang="en-US" altLang="ko-KR" sz="700" dirty="0">
                   <a:solidFill>
                     <a:srgbClr val="FF0000"/>
                   </a:solidFill>
@@ -4980,7 +4960,7 @@
             <a:lstStyle/>
             <a:p>
               <a:r>
-                <a:rPr lang="en-US" altLang="ko-KR" sz="700" dirty="0" smtClean="0">
+                <a:rPr lang="en-US" altLang="ko-KR" sz="700" dirty="0">
                   <a:solidFill>
                     <a:srgbClr val="FF0000"/>
                   </a:solidFill>
@@ -5018,7 +4998,7 @@
             <a:lstStyle/>
             <a:p>
               <a:r>
-                <a:rPr lang="en-US" altLang="ko-KR" sz="700" dirty="0" smtClean="0">
+                <a:rPr lang="en-US" altLang="ko-KR" sz="700" dirty="0">
                   <a:solidFill>
                     <a:srgbClr val="FF0000"/>
                   </a:solidFill>
@@ -5056,7 +5036,7 @@
             <a:lstStyle/>
             <a:p>
               <a:r>
-                <a:rPr lang="en-US" altLang="ko-KR" sz="700" dirty="0" smtClean="0">
+                <a:rPr lang="en-US" altLang="ko-KR" sz="700" dirty="0">
                   <a:solidFill>
                     <a:srgbClr val="FF0000"/>
                   </a:solidFill>
@@ -5094,7 +5074,7 @@
             <a:lstStyle/>
             <a:p>
               <a:r>
-                <a:rPr lang="en-US" altLang="ko-KR" sz="700" dirty="0" smtClean="0">
+                <a:rPr lang="en-US" altLang="ko-KR" sz="700" dirty="0">
                   <a:solidFill>
                     <a:srgbClr val="0000FF"/>
                   </a:solidFill>
@@ -5132,7 +5112,7 @@
             <a:lstStyle/>
             <a:p>
               <a:r>
-                <a:rPr lang="en-US" altLang="ko-KR" sz="700" dirty="0" smtClean="0">
+                <a:rPr lang="en-US" altLang="ko-KR" sz="700" dirty="0">
                   <a:solidFill>
                     <a:srgbClr val="0000FF"/>
                   </a:solidFill>
@@ -5178,6 +5158,1610 @@
           <a:chExt cx="0" cy="0"/>
         </a:xfrm>
       </p:grpSpPr>
+      <p:grpSp>
+        <p:nvGrpSpPr>
+          <p:cNvPr id="54" name="그룹 53">
+            <a:extLst>
+              <a:ext uri="{FF2B5EF4-FFF2-40B4-BE49-F238E27FC236}">
+                <a16:creationId xmlns:a16="http://schemas.microsoft.com/office/drawing/2014/main" id="{83709728-39E3-432D-8B8F-1419367A8D60}"/>
+              </a:ext>
+            </a:extLst>
+          </p:cNvPr>
+          <p:cNvGrpSpPr/>
+          <p:nvPr/>
+        </p:nvGrpSpPr>
+        <p:grpSpPr>
+          <a:xfrm>
+            <a:off x="1338943" y="477251"/>
+            <a:ext cx="10026888" cy="4165433"/>
+            <a:chOff x="1338943" y="477251"/>
+            <a:chExt cx="10026888" cy="4165433"/>
+          </a:xfrm>
+        </p:grpSpPr>
+        <p:sp>
+          <p:nvSpPr>
+            <p:cNvPr id="5" name="순서도: 수행의 시작/종료 4"/>
+            <p:cNvSpPr/>
+            <p:nvPr/>
+          </p:nvSpPr>
+          <p:spPr>
+            <a:xfrm>
+              <a:off x="4506690" y="477251"/>
+              <a:ext cx="1379764" cy="408214"/>
+            </a:xfrm>
+            <a:prstGeom prst="flowChartTerminator">
+              <a:avLst/>
+            </a:prstGeom>
+          </p:spPr>
+          <p:style>
+            <a:lnRef idx="2">
+              <a:schemeClr val="accent1">
+                <a:shade val="50000"/>
+              </a:schemeClr>
+            </a:lnRef>
+            <a:fillRef idx="1">
+              <a:schemeClr val="accent1"/>
+            </a:fillRef>
+            <a:effectRef idx="0">
+              <a:schemeClr val="accent1"/>
+            </a:effectRef>
+            <a:fontRef idx="minor">
+              <a:schemeClr val="lt1"/>
+            </a:fontRef>
+          </p:style>
+          <p:txBody>
+            <a:bodyPr rtlCol="0" anchor="ctr"/>
+            <a:lstStyle/>
+            <a:p>
+              <a:pPr algn="ctr"/>
+              <a:r>
+                <a:rPr lang="ko-KR" altLang="en-US" sz="800" dirty="0" err="1"/>
+                <a:t>브랜치</a:t>
+              </a:r>
+              <a:r>
+                <a:rPr lang="ko-KR" altLang="en-US" sz="800" dirty="0"/>
+                <a:t> 병합 취소</a:t>
+              </a:r>
+            </a:p>
+          </p:txBody>
+        </p:sp>
+        <p:sp>
+          <p:nvSpPr>
+            <p:cNvPr id="6" name="순서도: 판단 5"/>
+            <p:cNvSpPr/>
+            <p:nvPr/>
+          </p:nvSpPr>
+          <p:spPr>
+            <a:xfrm>
+              <a:off x="4247476" y="1146721"/>
+              <a:ext cx="1898192" cy="725939"/>
+            </a:xfrm>
+            <a:prstGeom prst="flowChartDecision">
+              <a:avLst/>
+            </a:prstGeom>
+          </p:spPr>
+          <p:style>
+            <a:lnRef idx="2">
+              <a:schemeClr val="accent1">
+                <a:shade val="50000"/>
+              </a:schemeClr>
+            </a:lnRef>
+            <a:fillRef idx="1">
+              <a:schemeClr val="accent1"/>
+            </a:fillRef>
+            <a:effectRef idx="0">
+              <a:schemeClr val="accent1"/>
+            </a:effectRef>
+            <a:fontRef idx="minor">
+              <a:schemeClr val="lt1"/>
+            </a:fontRef>
+          </p:style>
+          <p:txBody>
+            <a:bodyPr rtlCol="0" anchor="ctr"/>
+            <a:lstStyle/>
+            <a:p>
+              <a:pPr algn="ctr"/>
+              <a:r>
+                <a:rPr lang="ko-KR" altLang="en-US" sz="800" dirty="0"/>
+                <a:t>잘못된 병합 이후 현재 </a:t>
+              </a:r>
+              <a:r>
+                <a:rPr lang="ko-KR" altLang="en-US" sz="800" dirty="0" err="1"/>
+                <a:t>브랜치에</a:t>
+              </a:r>
+              <a:r>
+                <a:rPr lang="ko-KR" altLang="en-US" sz="800" dirty="0"/>
+                <a:t> </a:t>
+              </a:r>
+              <a:r>
+                <a:rPr lang="ko-KR" altLang="en-US" sz="800" dirty="0" err="1"/>
+                <a:t>커밋된</a:t>
+              </a:r>
+              <a:r>
+                <a:rPr lang="ko-KR" altLang="en-US" sz="800" dirty="0"/>
+                <a:t> 것이 있는가</a:t>
+              </a:r>
+              <a:r>
+                <a:rPr lang="en-US" altLang="ko-KR" sz="800" dirty="0"/>
+                <a:t>?</a:t>
+              </a:r>
+              <a:endParaRPr lang="ko-KR" altLang="en-US" sz="800" dirty="0"/>
+            </a:p>
+          </p:txBody>
+        </p:sp>
+        <p:sp>
+          <p:nvSpPr>
+            <p:cNvPr id="7" name="순서도: 판단 6"/>
+            <p:cNvSpPr/>
+            <p:nvPr/>
+          </p:nvSpPr>
+          <p:spPr>
+            <a:xfrm>
+              <a:off x="2409830" y="2069285"/>
+              <a:ext cx="1943100" cy="506188"/>
+            </a:xfrm>
+            <a:prstGeom prst="flowChartDecision">
+              <a:avLst/>
+            </a:prstGeom>
+          </p:spPr>
+          <p:style>
+            <a:lnRef idx="2">
+              <a:schemeClr val="accent1">
+                <a:shade val="50000"/>
+              </a:schemeClr>
+            </a:lnRef>
+            <a:fillRef idx="1">
+              <a:schemeClr val="accent1"/>
+            </a:fillRef>
+            <a:effectRef idx="0">
+              <a:schemeClr val="accent1"/>
+            </a:effectRef>
+            <a:fontRef idx="minor">
+              <a:schemeClr val="lt1"/>
+            </a:fontRef>
+          </p:style>
+          <p:txBody>
+            <a:bodyPr rtlCol="0" anchor="ctr"/>
+            <a:lstStyle/>
+            <a:p>
+              <a:pPr algn="ctr"/>
+              <a:r>
+                <a:rPr lang="ko-KR" altLang="en-US" sz="800" dirty="0"/>
+                <a:t>다른 </a:t>
+              </a:r>
+              <a:r>
+                <a:rPr lang="ko-KR" altLang="en-US" sz="800" dirty="0" err="1"/>
+                <a:t>브랜치가</a:t>
+              </a:r>
+              <a:r>
+                <a:rPr lang="ko-KR" altLang="en-US" sz="800" dirty="0"/>
+                <a:t> 삭제된 적이 있는가</a:t>
+              </a:r>
+              <a:r>
+                <a:rPr lang="en-US" altLang="ko-KR" sz="800" dirty="0"/>
+                <a:t>?</a:t>
+              </a:r>
+              <a:endParaRPr lang="ko-KR" altLang="en-US" sz="800" dirty="0"/>
+            </a:p>
+          </p:txBody>
+        </p:sp>
+        <p:sp>
+          <p:nvSpPr>
+            <p:cNvPr id="8" name="순서도: 판단 7"/>
+            <p:cNvSpPr/>
+            <p:nvPr/>
+          </p:nvSpPr>
+          <p:spPr>
+            <a:xfrm>
+              <a:off x="8069497" y="2069286"/>
+              <a:ext cx="1898192" cy="859667"/>
+            </a:xfrm>
+            <a:prstGeom prst="flowChartDecision">
+              <a:avLst/>
+            </a:prstGeom>
+          </p:spPr>
+          <p:style>
+            <a:lnRef idx="2">
+              <a:schemeClr val="accent1">
+                <a:shade val="50000"/>
+              </a:schemeClr>
+            </a:lnRef>
+            <a:fillRef idx="1">
+              <a:schemeClr val="accent1"/>
+            </a:fillRef>
+            <a:effectRef idx="0">
+              <a:schemeClr val="accent1"/>
+            </a:effectRef>
+            <a:fontRef idx="minor">
+              <a:schemeClr val="lt1"/>
+            </a:fontRef>
+          </p:style>
+          <p:txBody>
+            <a:bodyPr rtlCol="0" anchor="ctr"/>
+            <a:lstStyle/>
+            <a:p>
+              <a:pPr algn="ctr"/>
+              <a:r>
+                <a:rPr lang="ko-KR" altLang="en-US" sz="800" dirty="0"/>
+                <a:t>다시 병합할 수 있는 필요한 </a:t>
+              </a:r>
+              <a:r>
+                <a:rPr lang="ko-KR" altLang="en-US" sz="800" dirty="0" err="1"/>
+                <a:t>커밋이</a:t>
+              </a:r>
+              <a:r>
+                <a:rPr lang="ko-KR" altLang="en-US" sz="800" dirty="0"/>
+                <a:t> 다른 </a:t>
+              </a:r>
+              <a:r>
+                <a:rPr lang="ko-KR" altLang="en-US" sz="800" dirty="0" err="1"/>
+                <a:t>브랜치에</a:t>
+              </a:r>
+              <a:r>
+                <a:rPr lang="ko-KR" altLang="en-US" sz="800" dirty="0"/>
+                <a:t> 존재하는가</a:t>
+              </a:r>
+              <a:r>
+                <a:rPr lang="en-US" altLang="ko-KR" sz="800" dirty="0"/>
+                <a:t>?</a:t>
+              </a:r>
+              <a:endParaRPr lang="ko-KR" altLang="en-US" sz="800" dirty="0"/>
+            </a:p>
+          </p:txBody>
+        </p:sp>
+        <p:cxnSp>
+          <p:nvCxnSpPr>
+            <p:cNvPr id="10" name="직선 화살표 연결선 9"/>
+            <p:cNvCxnSpPr>
+              <a:cxnSpLocks/>
+              <a:stCxn id="5" idx="2"/>
+              <a:endCxn id="6" idx="0"/>
+            </p:cNvCxnSpPr>
+            <p:nvPr/>
+          </p:nvCxnSpPr>
+          <p:spPr>
+            <a:xfrm>
+              <a:off x="5196572" y="885465"/>
+              <a:ext cx="0" cy="261256"/>
+            </a:xfrm>
+            <a:prstGeom prst="straightConnector1">
+              <a:avLst/>
+            </a:prstGeom>
+            <a:ln>
+              <a:solidFill>
+                <a:schemeClr val="tx1"/>
+              </a:solidFill>
+              <a:tailEnd type="triangle"/>
+            </a:ln>
+          </p:spPr>
+          <p:style>
+            <a:lnRef idx="1">
+              <a:schemeClr val="accent1"/>
+            </a:lnRef>
+            <a:fillRef idx="0">
+              <a:schemeClr val="accent1"/>
+            </a:fillRef>
+            <a:effectRef idx="0">
+              <a:schemeClr val="accent1"/>
+            </a:effectRef>
+            <a:fontRef idx="minor">
+              <a:schemeClr val="tx1"/>
+            </a:fontRef>
+          </p:style>
+        </p:cxnSp>
+        <p:cxnSp>
+          <p:nvCxnSpPr>
+            <p:cNvPr id="12" name="꺾인 연결선 11"/>
+            <p:cNvCxnSpPr>
+              <a:cxnSpLocks/>
+              <a:stCxn id="6" idx="3"/>
+              <a:endCxn id="8" idx="0"/>
+            </p:cNvCxnSpPr>
+            <p:nvPr/>
+          </p:nvCxnSpPr>
+          <p:spPr>
+            <a:xfrm>
+              <a:off x="6145668" y="1509691"/>
+              <a:ext cx="2872925" cy="559595"/>
+            </a:xfrm>
+            <a:prstGeom prst="bentConnector2">
+              <a:avLst/>
+            </a:prstGeom>
+            <a:ln>
+              <a:solidFill>
+                <a:srgbClr val="0000FF"/>
+              </a:solidFill>
+              <a:tailEnd type="triangle"/>
+            </a:ln>
+          </p:spPr>
+          <p:style>
+            <a:lnRef idx="1">
+              <a:schemeClr val="accent1"/>
+            </a:lnRef>
+            <a:fillRef idx="0">
+              <a:schemeClr val="accent1"/>
+            </a:fillRef>
+            <a:effectRef idx="0">
+              <a:schemeClr val="accent1"/>
+            </a:effectRef>
+            <a:fontRef idx="minor">
+              <a:schemeClr val="tx1"/>
+            </a:fontRef>
+          </p:style>
+        </p:cxnSp>
+        <p:cxnSp>
+          <p:nvCxnSpPr>
+            <p:cNvPr id="14" name="꺾인 연결선 13"/>
+            <p:cNvCxnSpPr>
+              <a:cxnSpLocks/>
+              <a:stCxn id="6" idx="1"/>
+              <a:endCxn id="7" idx="0"/>
+            </p:cNvCxnSpPr>
+            <p:nvPr/>
+          </p:nvCxnSpPr>
+          <p:spPr>
+            <a:xfrm rot="10800000" flipV="1">
+              <a:off x="3381380" y="1509691"/>
+              <a:ext cx="866096" cy="559594"/>
+            </a:xfrm>
+            <a:prstGeom prst="bentConnector2">
+              <a:avLst/>
+            </a:prstGeom>
+            <a:ln>
+              <a:solidFill>
+                <a:srgbClr val="FF0000"/>
+              </a:solidFill>
+              <a:tailEnd type="triangle"/>
+            </a:ln>
+          </p:spPr>
+          <p:style>
+            <a:lnRef idx="1">
+              <a:schemeClr val="accent1"/>
+            </a:lnRef>
+            <a:fillRef idx="0">
+              <a:schemeClr val="accent1"/>
+            </a:fillRef>
+            <a:effectRef idx="0">
+              <a:schemeClr val="accent1"/>
+            </a:effectRef>
+            <a:fontRef idx="minor">
+              <a:schemeClr val="tx1"/>
+            </a:fontRef>
+          </p:style>
+        </p:cxnSp>
+        <p:sp>
+          <p:nvSpPr>
+            <p:cNvPr id="15" name="순서도: 판단 14"/>
+            <p:cNvSpPr/>
+            <p:nvPr/>
+          </p:nvSpPr>
+          <p:spPr>
+            <a:xfrm>
+              <a:off x="3569159" y="2874828"/>
+              <a:ext cx="1943100" cy="655866"/>
+            </a:xfrm>
+            <a:prstGeom prst="flowChartDecision">
+              <a:avLst/>
+            </a:prstGeom>
+          </p:spPr>
+          <p:style>
+            <a:lnRef idx="2">
+              <a:schemeClr val="accent1">
+                <a:shade val="50000"/>
+              </a:schemeClr>
+            </a:lnRef>
+            <a:fillRef idx="1">
+              <a:schemeClr val="accent1"/>
+            </a:fillRef>
+            <a:effectRef idx="0">
+              <a:schemeClr val="accent1"/>
+            </a:effectRef>
+            <a:fontRef idx="minor">
+              <a:schemeClr val="lt1"/>
+            </a:fontRef>
+          </p:style>
+          <p:txBody>
+            <a:bodyPr rtlCol="0" anchor="ctr"/>
+            <a:lstStyle/>
+            <a:p>
+              <a:pPr algn="ctr"/>
+              <a:r>
+                <a:rPr lang="ko-KR" altLang="en-US" sz="800" dirty="0"/>
+                <a:t>나중에 병합을 재시도할 것인가</a:t>
+              </a:r>
+              <a:r>
+                <a:rPr lang="en-US" altLang="ko-KR" sz="800" dirty="0"/>
+                <a:t>?</a:t>
+              </a:r>
+              <a:endParaRPr lang="ko-KR" altLang="en-US" sz="800" dirty="0"/>
+            </a:p>
+          </p:txBody>
+        </p:sp>
+        <p:cxnSp>
+          <p:nvCxnSpPr>
+            <p:cNvPr id="21" name="꺾인 연결선 20"/>
+            <p:cNvCxnSpPr>
+              <a:stCxn id="7" idx="3"/>
+              <a:endCxn id="15" idx="0"/>
+            </p:cNvCxnSpPr>
+            <p:nvPr/>
+          </p:nvCxnSpPr>
+          <p:spPr>
+            <a:xfrm>
+              <a:off x="4352930" y="2322379"/>
+              <a:ext cx="187779" cy="552449"/>
+            </a:xfrm>
+            <a:prstGeom prst="bentConnector2">
+              <a:avLst/>
+            </a:prstGeom>
+            <a:ln>
+              <a:solidFill>
+                <a:srgbClr val="0000FF"/>
+              </a:solidFill>
+              <a:tailEnd type="triangle"/>
+            </a:ln>
+          </p:spPr>
+          <p:style>
+            <a:lnRef idx="1">
+              <a:schemeClr val="accent1"/>
+            </a:lnRef>
+            <a:fillRef idx="0">
+              <a:schemeClr val="accent1"/>
+            </a:fillRef>
+            <a:effectRef idx="0">
+              <a:schemeClr val="accent1"/>
+            </a:effectRef>
+            <a:fontRef idx="minor">
+              <a:schemeClr val="tx1"/>
+            </a:fontRef>
+          </p:style>
+        </p:cxnSp>
+        <p:sp>
+          <p:nvSpPr>
+            <p:cNvPr id="22" name="순서도: 처리 21"/>
+            <p:cNvSpPr/>
+            <p:nvPr/>
+          </p:nvSpPr>
+          <p:spPr>
+            <a:xfrm>
+              <a:off x="1338943" y="3031669"/>
+              <a:ext cx="1616528" cy="342900"/>
+            </a:xfrm>
+            <a:prstGeom prst="flowChartProcess">
+              <a:avLst/>
+            </a:prstGeom>
+            <a:solidFill>
+              <a:srgbClr val="92D050"/>
+            </a:solidFill>
+            <a:ln>
+              <a:noFill/>
+            </a:ln>
+          </p:spPr>
+          <p:style>
+            <a:lnRef idx="2">
+              <a:schemeClr val="accent1">
+                <a:shade val="50000"/>
+              </a:schemeClr>
+            </a:lnRef>
+            <a:fillRef idx="1">
+              <a:schemeClr val="accent1"/>
+            </a:fillRef>
+            <a:effectRef idx="0">
+              <a:schemeClr val="accent1"/>
+            </a:effectRef>
+            <a:fontRef idx="minor">
+              <a:schemeClr val="lt1"/>
+            </a:fontRef>
+          </p:style>
+          <p:txBody>
+            <a:bodyPr rtlCol="0" anchor="ctr"/>
+            <a:lstStyle/>
+            <a:p>
+              <a:pPr algn="ctr"/>
+              <a:r>
+                <a:rPr lang="en-US" altLang="ko-KR" sz="900" dirty="0">
+                  <a:solidFill>
+                    <a:schemeClr val="tx1"/>
+                  </a:solidFill>
+                </a:rPr>
+                <a:t>reset –merge ORIG_HEAD</a:t>
+              </a:r>
+              <a:endParaRPr lang="ko-KR" altLang="en-US" sz="900" dirty="0">
+                <a:solidFill>
+                  <a:schemeClr val="tx1"/>
+                </a:solidFill>
+              </a:endParaRPr>
+            </a:p>
+          </p:txBody>
+        </p:sp>
+        <p:cxnSp>
+          <p:nvCxnSpPr>
+            <p:cNvPr id="24" name="꺾인 연결선 23"/>
+            <p:cNvCxnSpPr>
+              <a:stCxn id="7" idx="1"/>
+              <a:endCxn id="22" idx="0"/>
+            </p:cNvCxnSpPr>
+            <p:nvPr/>
+          </p:nvCxnSpPr>
+          <p:spPr>
+            <a:xfrm rot="10800000" flipV="1">
+              <a:off x="2147208" y="2322379"/>
+              <a:ext cx="262623" cy="709290"/>
+            </a:xfrm>
+            <a:prstGeom prst="bentConnector2">
+              <a:avLst/>
+            </a:prstGeom>
+            <a:ln>
+              <a:solidFill>
+                <a:srgbClr val="FF0000"/>
+              </a:solidFill>
+              <a:tailEnd type="triangle"/>
+            </a:ln>
+          </p:spPr>
+          <p:style>
+            <a:lnRef idx="1">
+              <a:schemeClr val="accent1"/>
+            </a:lnRef>
+            <a:fillRef idx="0">
+              <a:schemeClr val="accent1"/>
+            </a:fillRef>
+            <a:effectRef idx="0">
+              <a:schemeClr val="accent1"/>
+            </a:effectRef>
+            <a:fontRef idx="minor">
+              <a:schemeClr val="tx1"/>
+            </a:fontRef>
+          </p:style>
+        </p:cxnSp>
+        <p:sp>
+          <p:nvSpPr>
+            <p:cNvPr id="25" name="순서도: 처리 24"/>
+            <p:cNvSpPr/>
+            <p:nvPr/>
+          </p:nvSpPr>
+          <p:spPr>
+            <a:xfrm>
+              <a:off x="4951129" y="3772902"/>
+              <a:ext cx="1501379" cy="342900"/>
+            </a:xfrm>
+            <a:prstGeom prst="flowChartProcess">
+              <a:avLst/>
+            </a:prstGeom>
+            <a:solidFill>
+              <a:srgbClr val="FFC000"/>
+            </a:solidFill>
+            <a:ln>
+              <a:noFill/>
+            </a:ln>
+          </p:spPr>
+          <p:style>
+            <a:lnRef idx="2">
+              <a:schemeClr val="accent1">
+                <a:shade val="50000"/>
+              </a:schemeClr>
+            </a:lnRef>
+            <a:fillRef idx="1">
+              <a:schemeClr val="accent1"/>
+            </a:fillRef>
+            <a:effectRef idx="0">
+              <a:schemeClr val="accent1"/>
+            </a:effectRef>
+            <a:fontRef idx="minor">
+              <a:schemeClr val="lt1"/>
+            </a:fontRef>
+          </p:style>
+          <p:txBody>
+            <a:bodyPr rtlCol="0" anchor="ctr"/>
+            <a:lstStyle/>
+            <a:p>
+              <a:pPr algn="ctr"/>
+              <a:r>
+                <a:rPr lang="en-US" altLang="ko-KR" sz="900" dirty="0">
+                  <a:solidFill>
+                    <a:schemeClr val="tx1"/>
+                  </a:solidFill>
+                </a:rPr>
+                <a:t>checkout –b </a:t>
+              </a:r>
+              <a:r>
+                <a:rPr lang="en-US" altLang="ko-KR" sz="900" dirty="0" err="1">
+                  <a:solidFill>
+                    <a:schemeClr val="tx1"/>
+                  </a:solidFill>
+                </a:rPr>
+                <a:t>safe_branch</a:t>
+              </a:r>
+              <a:endParaRPr lang="ko-KR" altLang="en-US" sz="900" dirty="0">
+                <a:solidFill>
+                  <a:schemeClr val="tx1"/>
+                </a:solidFill>
+              </a:endParaRPr>
+            </a:p>
+          </p:txBody>
+        </p:sp>
+        <p:cxnSp>
+          <p:nvCxnSpPr>
+            <p:cNvPr id="27" name="꺾인 연결선 26"/>
+            <p:cNvCxnSpPr>
+              <a:cxnSpLocks/>
+              <a:stCxn id="15" idx="3"/>
+              <a:endCxn id="25" idx="0"/>
+            </p:cNvCxnSpPr>
+            <p:nvPr/>
+          </p:nvCxnSpPr>
+          <p:spPr>
+            <a:xfrm>
+              <a:off x="5512259" y="3202761"/>
+              <a:ext cx="189560" cy="570141"/>
+            </a:xfrm>
+            <a:prstGeom prst="bentConnector2">
+              <a:avLst/>
+            </a:prstGeom>
+            <a:ln>
+              <a:solidFill>
+                <a:srgbClr val="0000FF"/>
+              </a:solidFill>
+              <a:tailEnd type="triangle"/>
+            </a:ln>
+          </p:spPr>
+          <p:style>
+            <a:lnRef idx="1">
+              <a:schemeClr val="accent1"/>
+            </a:lnRef>
+            <a:fillRef idx="0">
+              <a:schemeClr val="accent1"/>
+            </a:fillRef>
+            <a:effectRef idx="0">
+              <a:schemeClr val="accent1"/>
+            </a:effectRef>
+            <a:fontRef idx="minor">
+              <a:schemeClr val="tx1"/>
+            </a:fontRef>
+          </p:style>
+        </p:cxnSp>
+        <p:sp>
+          <p:nvSpPr>
+            <p:cNvPr id="64" name="순서도: 처리 63"/>
+            <p:cNvSpPr/>
+            <p:nvPr/>
+          </p:nvSpPr>
+          <p:spPr>
+            <a:xfrm>
+              <a:off x="9172361" y="3099152"/>
+              <a:ext cx="2193470" cy="342900"/>
+            </a:xfrm>
+            <a:prstGeom prst="flowChartProcess">
+              <a:avLst/>
+            </a:prstGeom>
+            <a:solidFill>
+              <a:srgbClr val="FFC000"/>
+            </a:solidFill>
+            <a:ln>
+              <a:noFill/>
+            </a:ln>
+          </p:spPr>
+          <p:style>
+            <a:lnRef idx="2">
+              <a:schemeClr val="accent1">
+                <a:shade val="50000"/>
+              </a:schemeClr>
+            </a:lnRef>
+            <a:fillRef idx="1">
+              <a:schemeClr val="accent1"/>
+            </a:fillRef>
+            <a:effectRef idx="0">
+              <a:schemeClr val="accent1"/>
+            </a:effectRef>
+            <a:fontRef idx="minor">
+              <a:schemeClr val="lt1"/>
+            </a:fontRef>
+          </p:style>
+          <p:txBody>
+            <a:bodyPr rtlCol="0" anchor="ctr"/>
+            <a:lstStyle/>
+            <a:p>
+              <a:pPr algn="ctr"/>
+              <a:r>
+                <a:rPr lang="en-US" altLang="ko-KR" sz="900" dirty="0">
+                  <a:solidFill>
+                    <a:schemeClr val="tx1"/>
+                  </a:solidFill>
+                </a:rPr>
+                <a:t>reset &lt;</a:t>
+              </a:r>
+              <a:r>
+                <a:rPr lang="en-US" altLang="ko-KR" sz="900" dirty="0" err="1">
+                  <a:solidFill>
+                    <a:schemeClr val="tx1"/>
+                  </a:solidFill>
+                </a:rPr>
+                <a:t>last_correct_commit</a:t>
+              </a:r>
+              <a:r>
+                <a:rPr lang="en-US" altLang="ko-KR" sz="900" dirty="0">
+                  <a:solidFill>
+                    <a:schemeClr val="tx1"/>
+                  </a:solidFill>
+                </a:rPr>
+                <a:t>&gt;</a:t>
+              </a:r>
+            </a:p>
+            <a:p>
+              <a:pPr algn="ctr"/>
+              <a:r>
+                <a:rPr lang="en-US" altLang="ko-KR" sz="900" dirty="0">
+                  <a:solidFill>
+                    <a:schemeClr val="tx1"/>
+                  </a:solidFill>
+                </a:rPr>
+                <a:t>merge &lt;</a:t>
+              </a:r>
+              <a:r>
+                <a:rPr lang="en-US" altLang="ko-KR" sz="900" dirty="0" err="1">
+                  <a:solidFill>
+                    <a:schemeClr val="tx1"/>
+                  </a:solidFill>
+                </a:rPr>
+                <a:t>branch_with_good_commits</a:t>
+              </a:r>
+              <a:r>
+                <a:rPr lang="en-US" altLang="ko-KR" sz="900" dirty="0">
+                  <a:solidFill>
+                    <a:schemeClr val="tx1"/>
+                  </a:solidFill>
+                </a:rPr>
+                <a:t>&gt;</a:t>
+              </a:r>
+              <a:endParaRPr lang="ko-KR" altLang="en-US" sz="900" dirty="0">
+                <a:solidFill>
+                  <a:schemeClr val="tx1"/>
+                </a:solidFill>
+              </a:endParaRPr>
+            </a:p>
+          </p:txBody>
+        </p:sp>
+        <p:sp>
+          <p:nvSpPr>
+            <p:cNvPr id="70" name="순서도: 처리 69"/>
+            <p:cNvSpPr/>
+            <p:nvPr/>
+          </p:nvSpPr>
+          <p:spPr>
+            <a:xfrm>
+              <a:off x="6637538" y="3803409"/>
+              <a:ext cx="2316887" cy="667825"/>
+            </a:xfrm>
+            <a:prstGeom prst="flowChartProcess">
+              <a:avLst/>
+            </a:prstGeom>
+            <a:solidFill>
+              <a:srgbClr val="FFC000"/>
+            </a:solidFill>
+            <a:ln>
+              <a:noFill/>
+            </a:ln>
+          </p:spPr>
+          <p:style>
+            <a:lnRef idx="2">
+              <a:schemeClr val="accent1">
+                <a:shade val="50000"/>
+              </a:schemeClr>
+            </a:lnRef>
+            <a:fillRef idx="1">
+              <a:schemeClr val="accent1"/>
+            </a:fillRef>
+            <a:effectRef idx="0">
+              <a:schemeClr val="accent1"/>
+            </a:effectRef>
+            <a:fontRef idx="minor">
+              <a:schemeClr val="lt1"/>
+            </a:fontRef>
+          </p:style>
+          <p:txBody>
+            <a:bodyPr rtlCol="0" anchor="ctr"/>
+            <a:lstStyle/>
+            <a:p>
+              <a:r>
+                <a:rPr lang="en-US" altLang="ko-KR" sz="900" dirty="0">
+                  <a:solidFill>
+                    <a:schemeClr val="tx1"/>
+                  </a:solidFill>
+                </a:rPr>
+                <a:t>checkout</a:t>
+              </a:r>
+              <a:r>
+                <a:rPr lang="ko-KR" altLang="en-US" sz="900" dirty="0">
+                  <a:solidFill>
+                    <a:schemeClr val="tx1"/>
+                  </a:solidFill>
+                </a:rPr>
+                <a:t> </a:t>
+              </a:r>
+              <a:r>
+                <a:rPr lang="en-US" altLang="ko-KR" sz="900" dirty="0">
+                  <a:solidFill>
+                    <a:schemeClr val="tx1"/>
+                  </a:solidFill>
+                </a:rPr>
+                <a:t>&lt;</a:t>
+              </a:r>
+              <a:r>
+                <a:rPr lang="en-US" altLang="ko-KR" sz="900" dirty="0" err="1">
+                  <a:solidFill>
+                    <a:schemeClr val="tx1"/>
+                  </a:solidFill>
+                </a:rPr>
+                <a:t>commit_before_bad_merge</a:t>
+              </a:r>
+              <a:r>
+                <a:rPr lang="en-US" altLang="ko-KR" sz="900" dirty="0">
+                  <a:solidFill>
+                    <a:schemeClr val="tx1"/>
+                  </a:solidFill>
+                </a:rPr>
+                <a:t>&gt;</a:t>
+              </a:r>
+            </a:p>
+            <a:p>
+              <a:r>
+                <a:rPr lang="en-US" altLang="ko-KR" sz="900" dirty="0">
+                  <a:solidFill>
+                    <a:schemeClr val="tx1"/>
+                  </a:solidFill>
+                </a:rPr>
+                <a:t>checkout –b </a:t>
+              </a:r>
+              <a:r>
+                <a:rPr lang="en-US" altLang="ko-KR" sz="900" dirty="0" err="1">
+                  <a:solidFill>
+                    <a:schemeClr val="tx1"/>
+                  </a:solidFill>
+                </a:rPr>
+                <a:t>safe_branch</a:t>
+              </a:r>
+              <a:endParaRPr lang="en-US" altLang="ko-KR" sz="900" dirty="0">
+                <a:solidFill>
+                  <a:schemeClr val="tx1"/>
+                </a:solidFill>
+              </a:endParaRPr>
+            </a:p>
+            <a:p>
+              <a:r>
+                <a:rPr lang="en-US" altLang="ko-KR" sz="900" dirty="0">
+                  <a:solidFill>
+                    <a:schemeClr val="tx1"/>
+                  </a:solidFill>
+                </a:rPr>
+                <a:t>cherry-pick &lt;</a:t>
+              </a:r>
+              <a:r>
+                <a:rPr lang="en-US" altLang="ko-KR" sz="900" dirty="0" err="1">
+                  <a:solidFill>
+                    <a:schemeClr val="tx1"/>
+                  </a:solidFill>
+                </a:rPr>
+                <a:t>commit_to_save</a:t>
+              </a:r>
+              <a:r>
+                <a:rPr lang="en-US" altLang="ko-KR" sz="900" dirty="0">
+                  <a:solidFill>
+                    <a:schemeClr val="tx1"/>
+                  </a:solidFill>
+                </a:rPr>
+                <a:t>&gt;</a:t>
+              </a:r>
+            </a:p>
+            <a:p>
+              <a:r>
+                <a:rPr lang="en-US" altLang="ko-KR" sz="900" dirty="0">
+                  <a:solidFill>
+                    <a:schemeClr val="tx1"/>
+                  </a:solidFill>
+                </a:rPr>
+                <a:t>checkout &lt;</a:t>
+              </a:r>
+              <a:r>
+                <a:rPr lang="en-US" altLang="ko-KR" sz="900" dirty="0" err="1">
+                  <a:solidFill>
+                    <a:schemeClr val="tx1"/>
+                  </a:solidFill>
+                </a:rPr>
+                <a:t>branch_to_fix</a:t>
+              </a:r>
+              <a:r>
+                <a:rPr lang="en-US" altLang="ko-KR" sz="900" dirty="0">
+                  <a:solidFill>
+                    <a:schemeClr val="tx1"/>
+                  </a:solidFill>
+                </a:rPr>
+                <a:t>&gt;</a:t>
+              </a:r>
+              <a:endParaRPr lang="ko-KR" altLang="en-US" sz="900" dirty="0">
+                <a:solidFill>
+                  <a:schemeClr val="tx1"/>
+                </a:solidFill>
+              </a:endParaRPr>
+            </a:p>
+          </p:txBody>
+        </p:sp>
+        <p:sp>
+          <p:nvSpPr>
+            <p:cNvPr id="73" name="TextBox 72"/>
+            <p:cNvSpPr txBox="1"/>
+            <p:nvPr/>
+          </p:nvSpPr>
+          <p:spPr>
+            <a:xfrm>
+              <a:off x="6056542" y="1203858"/>
+              <a:ext cx="324525" cy="200055"/>
+            </a:xfrm>
+            <a:prstGeom prst="rect">
+              <a:avLst/>
+            </a:prstGeom>
+            <a:noFill/>
+          </p:spPr>
+          <p:txBody>
+            <a:bodyPr wrap="square" rtlCol="0">
+              <a:spAutoFit/>
+            </a:bodyPr>
+            <a:lstStyle/>
+            <a:p>
+              <a:r>
+                <a:rPr lang="en-US" altLang="ko-KR" sz="700" dirty="0">
+                  <a:solidFill>
+                    <a:srgbClr val="0000FF"/>
+                  </a:solidFill>
+                </a:rPr>
+                <a:t>Yes</a:t>
+              </a:r>
+              <a:endParaRPr lang="ko-KR" altLang="en-US" sz="700" dirty="0">
+                <a:solidFill>
+                  <a:srgbClr val="0000FF"/>
+                </a:solidFill>
+              </a:endParaRPr>
+            </a:p>
+          </p:txBody>
+        </p:sp>
+        <p:sp>
+          <p:nvSpPr>
+            <p:cNvPr id="74" name="TextBox 73"/>
+            <p:cNvSpPr txBox="1"/>
+            <p:nvPr/>
+          </p:nvSpPr>
+          <p:spPr>
+            <a:xfrm>
+              <a:off x="7752992" y="2305818"/>
+              <a:ext cx="324525" cy="200055"/>
+            </a:xfrm>
+            <a:prstGeom prst="rect">
+              <a:avLst/>
+            </a:prstGeom>
+            <a:noFill/>
+          </p:spPr>
+          <p:txBody>
+            <a:bodyPr wrap="square" rtlCol="0">
+              <a:spAutoFit/>
+            </a:bodyPr>
+            <a:lstStyle/>
+            <a:p>
+              <a:r>
+                <a:rPr lang="en-US" altLang="ko-KR" sz="700" dirty="0">
+                  <a:solidFill>
+                    <a:srgbClr val="FF0000"/>
+                  </a:solidFill>
+                </a:rPr>
+                <a:t>No</a:t>
+              </a:r>
+              <a:endParaRPr lang="ko-KR" altLang="en-US" sz="700" dirty="0">
+                <a:solidFill>
+                  <a:srgbClr val="FF0000"/>
+                </a:solidFill>
+              </a:endParaRPr>
+            </a:p>
+          </p:txBody>
+        </p:sp>
+        <p:sp>
+          <p:nvSpPr>
+            <p:cNvPr id="78" name="TextBox 77"/>
+            <p:cNvSpPr txBox="1"/>
+            <p:nvPr/>
+          </p:nvSpPr>
+          <p:spPr>
+            <a:xfrm>
+              <a:off x="9967689" y="2305817"/>
+              <a:ext cx="324525" cy="200055"/>
+            </a:xfrm>
+            <a:prstGeom prst="rect">
+              <a:avLst/>
+            </a:prstGeom>
+            <a:noFill/>
+          </p:spPr>
+          <p:txBody>
+            <a:bodyPr wrap="square" rtlCol="0">
+              <a:spAutoFit/>
+            </a:bodyPr>
+            <a:lstStyle/>
+            <a:p>
+              <a:r>
+                <a:rPr lang="en-US" altLang="ko-KR" sz="700" dirty="0">
+                  <a:solidFill>
+                    <a:srgbClr val="0000FF"/>
+                  </a:solidFill>
+                </a:rPr>
+                <a:t>Yes</a:t>
+              </a:r>
+              <a:endParaRPr lang="ko-KR" altLang="en-US" sz="700" dirty="0">
+                <a:solidFill>
+                  <a:srgbClr val="0000FF"/>
+                </a:solidFill>
+              </a:endParaRPr>
+            </a:p>
+          </p:txBody>
+        </p:sp>
+        <p:sp>
+          <p:nvSpPr>
+            <p:cNvPr id="82" name="TextBox 81"/>
+            <p:cNvSpPr txBox="1"/>
+            <p:nvPr/>
+          </p:nvSpPr>
+          <p:spPr>
+            <a:xfrm>
+              <a:off x="3952877" y="1203857"/>
+              <a:ext cx="324525" cy="200055"/>
+            </a:xfrm>
+            <a:prstGeom prst="rect">
+              <a:avLst/>
+            </a:prstGeom>
+            <a:noFill/>
+          </p:spPr>
+          <p:txBody>
+            <a:bodyPr wrap="square" rtlCol="0">
+              <a:spAutoFit/>
+            </a:bodyPr>
+            <a:lstStyle/>
+            <a:p>
+              <a:r>
+                <a:rPr lang="en-US" altLang="ko-KR" sz="700" dirty="0">
+                  <a:solidFill>
+                    <a:srgbClr val="FF0000"/>
+                  </a:solidFill>
+                </a:rPr>
+                <a:t>No</a:t>
+              </a:r>
+              <a:endParaRPr lang="ko-KR" altLang="en-US" sz="700" dirty="0">
+                <a:solidFill>
+                  <a:srgbClr val="FF0000"/>
+                </a:solidFill>
+              </a:endParaRPr>
+            </a:p>
+          </p:txBody>
+        </p:sp>
+        <p:sp>
+          <p:nvSpPr>
+            <p:cNvPr id="83" name="TextBox 82"/>
+            <p:cNvSpPr txBox="1"/>
+            <p:nvPr/>
+          </p:nvSpPr>
+          <p:spPr>
+            <a:xfrm>
+              <a:off x="2091764" y="2118549"/>
+              <a:ext cx="324525" cy="200055"/>
+            </a:xfrm>
+            <a:prstGeom prst="rect">
+              <a:avLst/>
+            </a:prstGeom>
+            <a:noFill/>
+          </p:spPr>
+          <p:txBody>
+            <a:bodyPr wrap="square" rtlCol="0">
+              <a:spAutoFit/>
+            </a:bodyPr>
+            <a:lstStyle/>
+            <a:p>
+              <a:r>
+                <a:rPr lang="en-US" altLang="ko-KR" sz="700" dirty="0">
+                  <a:solidFill>
+                    <a:srgbClr val="FF0000"/>
+                  </a:solidFill>
+                </a:rPr>
+                <a:t>No</a:t>
+              </a:r>
+              <a:endParaRPr lang="ko-KR" altLang="en-US" sz="700" dirty="0">
+                <a:solidFill>
+                  <a:srgbClr val="FF0000"/>
+                </a:solidFill>
+              </a:endParaRPr>
+            </a:p>
+          </p:txBody>
+        </p:sp>
+        <p:sp>
+          <p:nvSpPr>
+            <p:cNvPr id="84" name="TextBox 83"/>
+            <p:cNvSpPr txBox="1"/>
+            <p:nvPr/>
+          </p:nvSpPr>
+          <p:spPr>
+            <a:xfrm>
+              <a:off x="3343289" y="3000316"/>
+              <a:ext cx="324525" cy="200055"/>
+            </a:xfrm>
+            <a:prstGeom prst="rect">
+              <a:avLst/>
+            </a:prstGeom>
+            <a:noFill/>
+          </p:spPr>
+          <p:txBody>
+            <a:bodyPr wrap="square" rtlCol="0">
+              <a:spAutoFit/>
+            </a:bodyPr>
+            <a:lstStyle/>
+            <a:p>
+              <a:r>
+                <a:rPr lang="en-US" altLang="ko-KR" sz="700" dirty="0">
+                  <a:solidFill>
+                    <a:srgbClr val="FF0000"/>
+                  </a:solidFill>
+                </a:rPr>
+                <a:t>No</a:t>
+              </a:r>
+              <a:endParaRPr lang="ko-KR" altLang="en-US" sz="700" dirty="0">
+                <a:solidFill>
+                  <a:srgbClr val="FF0000"/>
+                </a:solidFill>
+              </a:endParaRPr>
+            </a:p>
+          </p:txBody>
+        </p:sp>
+        <p:sp>
+          <p:nvSpPr>
+            <p:cNvPr id="85" name="TextBox 84"/>
+            <p:cNvSpPr txBox="1"/>
+            <p:nvPr/>
+          </p:nvSpPr>
+          <p:spPr>
+            <a:xfrm>
+              <a:off x="4267906" y="2127752"/>
+              <a:ext cx="324525" cy="200055"/>
+            </a:xfrm>
+            <a:prstGeom prst="rect">
+              <a:avLst/>
+            </a:prstGeom>
+            <a:noFill/>
+          </p:spPr>
+          <p:txBody>
+            <a:bodyPr wrap="square" rtlCol="0">
+              <a:spAutoFit/>
+            </a:bodyPr>
+            <a:lstStyle/>
+            <a:p>
+              <a:r>
+                <a:rPr lang="en-US" altLang="ko-KR" sz="700" dirty="0">
+                  <a:solidFill>
+                    <a:srgbClr val="0000FF"/>
+                  </a:solidFill>
+                </a:rPr>
+                <a:t>Yes</a:t>
+              </a:r>
+              <a:endParaRPr lang="ko-KR" altLang="en-US" sz="700" dirty="0">
+                <a:solidFill>
+                  <a:srgbClr val="0000FF"/>
+                </a:solidFill>
+              </a:endParaRPr>
+            </a:p>
+          </p:txBody>
+        </p:sp>
+        <p:sp>
+          <p:nvSpPr>
+            <p:cNvPr id="86" name="TextBox 85"/>
+            <p:cNvSpPr txBox="1"/>
+            <p:nvPr/>
+          </p:nvSpPr>
+          <p:spPr>
+            <a:xfrm>
+              <a:off x="5449834" y="3012506"/>
+              <a:ext cx="324525" cy="200055"/>
+            </a:xfrm>
+            <a:prstGeom prst="rect">
+              <a:avLst/>
+            </a:prstGeom>
+            <a:noFill/>
+          </p:spPr>
+          <p:txBody>
+            <a:bodyPr wrap="square" rtlCol="0">
+              <a:spAutoFit/>
+            </a:bodyPr>
+            <a:lstStyle/>
+            <a:p>
+              <a:r>
+                <a:rPr lang="en-US" altLang="ko-KR" sz="700" dirty="0">
+                  <a:solidFill>
+                    <a:srgbClr val="0000FF"/>
+                  </a:solidFill>
+                </a:rPr>
+                <a:t>Yes</a:t>
+              </a:r>
+              <a:endParaRPr lang="ko-KR" altLang="en-US" sz="700" dirty="0">
+                <a:solidFill>
+                  <a:srgbClr val="0000FF"/>
+                </a:solidFill>
+              </a:endParaRPr>
+            </a:p>
+          </p:txBody>
+        </p:sp>
+        <p:sp>
+          <p:nvSpPr>
+            <p:cNvPr id="57" name="순서도: 처리 56">
+              <a:extLst>
+                <a:ext uri="{FF2B5EF4-FFF2-40B4-BE49-F238E27FC236}">
+                  <a16:creationId xmlns:a16="http://schemas.microsoft.com/office/drawing/2014/main" id="{035CA012-1501-4CC7-9CCD-3C37FBDC588A}"/>
+                </a:ext>
+              </a:extLst>
+            </p:cNvPr>
+            <p:cNvSpPr/>
+            <p:nvPr/>
+          </p:nvSpPr>
+          <p:spPr>
+            <a:xfrm>
+              <a:off x="2943574" y="4299784"/>
+              <a:ext cx="1616527" cy="342900"/>
+            </a:xfrm>
+            <a:prstGeom prst="flowChartProcess">
+              <a:avLst/>
+            </a:prstGeom>
+            <a:solidFill>
+              <a:srgbClr val="FFC000"/>
+            </a:solidFill>
+            <a:ln>
+              <a:noFill/>
+            </a:ln>
+          </p:spPr>
+          <p:style>
+            <a:lnRef idx="2">
+              <a:schemeClr val="accent1">
+                <a:shade val="50000"/>
+              </a:schemeClr>
+            </a:lnRef>
+            <a:fillRef idx="1">
+              <a:schemeClr val="accent1"/>
+            </a:fillRef>
+            <a:effectRef idx="0">
+              <a:schemeClr val="accent1"/>
+            </a:effectRef>
+            <a:fontRef idx="minor">
+              <a:schemeClr val="lt1"/>
+            </a:fontRef>
+          </p:style>
+          <p:txBody>
+            <a:bodyPr rtlCol="0" anchor="ctr"/>
+            <a:lstStyle/>
+            <a:p>
+              <a:pPr algn="ctr"/>
+              <a:r>
+                <a:rPr lang="en-US" altLang="ko-KR" sz="900" dirty="0">
+                  <a:solidFill>
+                    <a:schemeClr val="tx1"/>
+                  </a:solidFill>
+                </a:rPr>
+                <a:t>checkout &lt;</a:t>
+              </a:r>
+              <a:r>
+                <a:rPr lang="en-US" altLang="ko-KR" sz="900" dirty="0" err="1">
+                  <a:solidFill>
+                    <a:schemeClr val="tx1"/>
+                  </a:solidFill>
+                </a:rPr>
+                <a:t>branch_to_fix</a:t>
+              </a:r>
+              <a:r>
+                <a:rPr lang="en-US" altLang="ko-KR" sz="900" dirty="0">
+                  <a:solidFill>
+                    <a:schemeClr val="tx1"/>
+                  </a:solidFill>
+                </a:rPr>
+                <a:t>&gt;</a:t>
+              </a:r>
+              <a:endParaRPr lang="ko-KR" altLang="en-US" sz="900" dirty="0">
+                <a:solidFill>
+                  <a:schemeClr val="tx1"/>
+                </a:solidFill>
+              </a:endParaRPr>
+            </a:p>
+          </p:txBody>
+        </p:sp>
+        <p:cxnSp>
+          <p:nvCxnSpPr>
+            <p:cNvPr id="11" name="직선 화살표 연결선 10">
+              <a:extLst>
+                <a:ext uri="{FF2B5EF4-FFF2-40B4-BE49-F238E27FC236}">
+                  <a16:creationId xmlns:a16="http://schemas.microsoft.com/office/drawing/2014/main" id="{591E9953-D7E6-4428-A5AF-D8E248C15373}"/>
+                </a:ext>
+              </a:extLst>
+            </p:cNvPr>
+            <p:cNvCxnSpPr>
+              <a:stCxn id="15" idx="1"/>
+              <a:endCxn id="22" idx="3"/>
+            </p:cNvCxnSpPr>
+            <p:nvPr/>
+          </p:nvCxnSpPr>
+          <p:spPr>
+            <a:xfrm flipH="1">
+              <a:off x="2955471" y="3202761"/>
+              <a:ext cx="613688" cy="358"/>
+            </a:xfrm>
+            <a:prstGeom prst="straightConnector1">
+              <a:avLst/>
+            </a:prstGeom>
+            <a:ln>
+              <a:solidFill>
+                <a:srgbClr val="FF0000"/>
+              </a:solidFill>
+              <a:tailEnd type="triangle"/>
+            </a:ln>
+          </p:spPr>
+          <p:style>
+            <a:lnRef idx="1">
+              <a:schemeClr val="accent1"/>
+            </a:lnRef>
+            <a:fillRef idx="0">
+              <a:schemeClr val="accent1"/>
+            </a:fillRef>
+            <a:effectRef idx="0">
+              <a:schemeClr val="accent1"/>
+            </a:effectRef>
+            <a:fontRef idx="minor">
+              <a:schemeClr val="tx1"/>
+            </a:fontRef>
+          </p:style>
+        </p:cxnSp>
+        <p:cxnSp>
+          <p:nvCxnSpPr>
+            <p:cNvPr id="26" name="연결선: 꺾임 25">
+              <a:extLst>
+                <a:ext uri="{FF2B5EF4-FFF2-40B4-BE49-F238E27FC236}">
+                  <a16:creationId xmlns:a16="http://schemas.microsoft.com/office/drawing/2014/main" id="{0264E3C7-1A24-4F62-AF82-DB654241C472}"/>
+                </a:ext>
+              </a:extLst>
+            </p:cNvPr>
+            <p:cNvCxnSpPr>
+              <a:cxnSpLocks/>
+              <a:stCxn id="25" idx="2"/>
+              <a:endCxn id="57" idx="3"/>
+            </p:cNvCxnSpPr>
+            <p:nvPr/>
+          </p:nvCxnSpPr>
+          <p:spPr>
+            <a:xfrm rot="5400000">
+              <a:off x="4953244" y="3722659"/>
+              <a:ext cx="355432" cy="1141718"/>
+            </a:xfrm>
+            <a:prstGeom prst="bentConnector2">
+              <a:avLst/>
+            </a:prstGeom>
+            <a:ln>
+              <a:tailEnd type="triangle"/>
+            </a:ln>
+          </p:spPr>
+          <p:style>
+            <a:lnRef idx="1">
+              <a:schemeClr val="accent1"/>
+            </a:lnRef>
+            <a:fillRef idx="0">
+              <a:schemeClr val="accent1"/>
+            </a:fillRef>
+            <a:effectRef idx="0">
+              <a:schemeClr val="accent1"/>
+            </a:effectRef>
+            <a:fontRef idx="minor">
+              <a:schemeClr val="tx1"/>
+            </a:fontRef>
+          </p:style>
+        </p:cxnSp>
+        <p:cxnSp>
+          <p:nvCxnSpPr>
+            <p:cNvPr id="35" name="연결선: 꺾임 34">
+              <a:extLst>
+                <a:ext uri="{FF2B5EF4-FFF2-40B4-BE49-F238E27FC236}">
+                  <a16:creationId xmlns:a16="http://schemas.microsoft.com/office/drawing/2014/main" id="{6AC7D18C-1F37-4383-95E9-8EEA37454385}"/>
+                </a:ext>
+              </a:extLst>
+            </p:cNvPr>
+            <p:cNvCxnSpPr>
+              <a:stCxn id="57" idx="1"/>
+              <a:endCxn id="22" idx="2"/>
+            </p:cNvCxnSpPr>
+            <p:nvPr/>
+          </p:nvCxnSpPr>
+          <p:spPr>
+            <a:xfrm rot="10800000">
+              <a:off x="2147208" y="3374570"/>
+              <a:ext cx="796367" cy="1096665"/>
+            </a:xfrm>
+            <a:prstGeom prst="bentConnector2">
+              <a:avLst/>
+            </a:prstGeom>
+            <a:ln>
+              <a:tailEnd type="triangle"/>
+            </a:ln>
+          </p:spPr>
+          <p:style>
+            <a:lnRef idx="1">
+              <a:schemeClr val="accent1"/>
+            </a:lnRef>
+            <a:fillRef idx="0">
+              <a:schemeClr val="accent1"/>
+            </a:fillRef>
+            <a:effectRef idx="0">
+              <a:schemeClr val="accent1"/>
+            </a:effectRef>
+            <a:fontRef idx="minor">
+              <a:schemeClr val="tx1"/>
+            </a:fontRef>
+          </p:style>
+        </p:cxnSp>
+        <p:cxnSp>
+          <p:nvCxnSpPr>
+            <p:cNvPr id="43" name="연결선: 꺾임 42">
+              <a:extLst>
+                <a:ext uri="{FF2B5EF4-FFF2-40B4-BE49-F238E27FC236}">
+                  <a16:creationId xmlns:a16="http://schemas.microsoft.com/office/drawing/2014/main" id="{80309435-4F77-4A22-A242-014EFAE1D9EC}"/>
+                </a:ext>
+              </a:extLst>
+            </p:cNvPr>
+            <p:cNvCxnSpPr>
+              <a:cxnSpLocks/>
+              <a:stCxn id="8" idx="1"/>
+              <a:endCxn id="70" idx="0"/>
+            </p:cNvCxnSpPr>
+            <p:nvPr/>
+          </p:nvCxnSpPr>
+          <p:spPr>
+            <a:xfrm rot="10800000" flipV="1">
+              <a:off x="7795983" y="2499119"/>
+              <a:ext cx="273515" cy="1304289"/>
+            </a:xfrm>
+            <a:prstGeom prst="bentConnector2">
+              <a:avLst/>
+            </a:prstGeom>
+            <a:ln>
+              <a:solidFill>
+                <a:srgbClr val="FF0000"/>
+              </a:solidFill>
+              <a:tailEnd type="triangle"/>
+            </a:ln>
+          </p:spPr>
+          <p:style>
+            <a:lnRef idx="1">
+              <a:schemeClr val="accent1"/>
+            </a:lnRef>
+            <a:fillRef idx="0">
+              <a:schemeClr val="accent1"/>
+            </a:fillRef>
+            <a:effectRef idx="0">
+              <a:schemeClr val="accent1"/>
+            </a:effectRef>
+            <a:fontRef idx="minor">
+              <a:schemeClr val="tx1"/>
+            </a:fontRef>
+          </p:style>
+        </p:cxnSp>
+        <p:cxnSp>
+          <p:nvCxnSpPr>
+            <p:cNvPr id="47" name="연결선: 꺾임 46">
+              <a:extLst>
+                <a:ext uri="{FF2B5EF4-FFF2-40B4-BE49-F238E27FC236}">
+                  <a16:creationId xmlns:a16="http://schemas.microsoft.com/office/drawing/2014/main" id="{3B8126D0-9CE2-4706-877E-7E512E58CF5C}"/>
+                </a:ext>
+              </a:extLst>
+            </p:cNvPr>
+            <p:cNvCxnSpPr>
+              <a:stCxn id="8" idx="3"/>
+              <a:endCxn id="64" idx="0"/>
+            </p:cNvCxnSpPr>
+            <p:nvPr/>
+          </p:nvCxnSpPr>
+          <p:spPr>
+            <a:xfrm>
+              <a:off x="9967689" y="2499120"/>
+              <a:ext cx="301407" cy="600032"/>
+            </a:xfrm>
+            <a:prstGeom prst="bentConnector2">
+              <a:avLst/>
+            </a:prstGeom>
+            <a:ln>
+              <a:solidFill>
+                <a:srgbClr val="0000FF"/>
+              </a:solidFill>
+              <a:tailEnd type="triangle"/>
+            </a:ln>
+          </p:spPr>
+          <p:style>
+            <a:lnRef idx="1">
+              <a:schemeClr val="accent1"/>
+            </a:lnRef>
+            <a:fillRef idx="0">
+              <a:schemeClr val="accent1"/>
+            </a:fillRef>
+            <a:effectRef idx="0">
+              <a:schemeClr val="accent1"/>
+            </a:effectRef>
+            <a:fontRef idx="minor">
+              <a:schemeClr val="tx1"/>
+            </a:fontRef>
+          </p:style>
+        </p:cxnSp>
+        <p:cxnSp>
+          <p:nvCxnSpPr>
+            <p:cNvPr id="51" name="연결선: 꺾임 50">
+              <a:extLst>
+                <a:ext uri="{FF2B5EF4-FFF2-40B4-BE49-F238E27FC236}">
+                  <a16:creationId xmlns:a16="http://schemas.microsoft.com/office/drawing/2014/main" id="{11777A2F-1E51-407B-AF4E-9B110026C5CD}"/>
+                </a:ext>
+              </a:extLst>
+            </p:cNvPr>
+            <p:cNvCxnSpPr>
+              <a:stCxn id="70" idx="3"/>
+              <a:endCxn id="64" idx="2"/>
+            </p:cNvCxnSpPr>
+            <p:nvPr/>
+          </p:nvCxnSpPr>
+          <p:spPr>
+            <a:xfrm flipV="1">
+              <a:off x="8954425" y="3442052"/>
+              <a:ext cx="1314671" cy="695270"/>
+            </a:xfrm>
+            <a:prstGeom prst="bentConnector2">
+              <a:avLst/>
+            </a:prstGeom>
+            <a:ln>
+              <a:tailEnd type="triangle"/>
+            </a:ln>
+          </p:spPr>
+          <p:style>
+            <a:lnRef idx="1">
+              <a:schemeClr val="accent1"/>
+            </a:lnRef>
+            <a:fillRef idx="0">
+              <a:schemeClr val="accent1"/>
+            </a:fillRef>
+            <a:effectRef idx="0">
+              <a:schemeClr val="accent1"/>
+            </a:effectRef>
+            <a:fontRef idx="minor">
+              <a:schemeClr val="tx1"/>
+            </a:fontRef>
+          </p:style>
+        </p:cxnSp>
+      </p:grpSp>
+    </p:spTree>
+    <p:extLst>
+      <p:ext uri="{BB962C8B-B14F-4D97-AF65-F5344CB8AC3E}">
+        <p14:creationId xmlns:p14="http://schemas.microsoft.com/office/powerpoint/2010/main" val="1024108117"/>
+      </p:ext>
+    </p:extLst>
+  </p:cSld>
+  <p:clrMapOvr>
+    <a:masterClrMapping/>
+  </p:clrMapOvr>
+</p:sld>
+</file>
+
+<file path=ppt/slides/slide3.xml><?xml version="1.0" encoding="utf-8"?>
+<p:sld xmlns:a="http://schemas.openxmlformats.org/drawingml/2006/main" xmlns:r="http://schemas.openxmlformats.org/officeDocument/2006/relationships" xmlns:p="http://schemas.openxmlformats.org/presentationml/2006/main">
+  <p:cSld>
+    <p:spTree>
+      <p:nvGrpSpPr>
+        <p:cNvPr id="1" name=""/>
+        <p:cNvGrpSpPr/>
+        <p:nvPr/>
+      </p:nvGrpSpPr>
+      <p:grpSpPr>
+        <a:xfrm>
+          <a:off x="0" y="0"/>
+          <a:ext cx="0" cy="0"/>
+          <a:chOff x="0" y="0"/>
+          <a:chExt cx="0" cy="0"/>
+        </a:xfrm>
+      </p:grpSpPr>
     </p:spTree>
     <p:extLst>
       <p:ext uri="{BB962C8B-B14F-4D97-AF65-F5344CB8AC3E}">
@@ -5191,7 +6775,7 @@
 </p:sld>
 </file>
 
-<file path=ppt/slides/slide3.xml><?xml version="1.0" encoding="utf-8"?>
+<file path=ppt/slides/slide4.xml><?xml version="1.0" encoding="utf-8"?>
 <p:sld xmlns:a="http://schemas.openxmlformats.org/drawingml/2006/main" xmlns:r="http://schemas.openxmlformats.org/officeDocument/2006/relationships" xmlns:p="http://schemas.openxmlformats.org/presentationml/2006/main">
   <p:cSld>
     <p:spTree>

</xml_diff>